<commit_message>
Update the links in report
</commit_message>
<xml_diff>
--- a/Combating MCI using Carrier Sensing.pptx
+++ b/Combating MCI using Carrier Sensing.pptx
@@ -13649,8 +13649,8 @@
         </p:nvSpPr>
         <p:spPr>
           <a:xfrm>
-            <a:off x="5353397" y="6537110"/>
-            <a:ext cx="3907157" cy="392100"/>
+            <a:off x="5241409" y="6465900"/>
+            <a:ext cx="5345084" cy="392100"/>
           </a:xfrm>
           <a:prstGeom prst="rect">
             <a:avLst/>
@@ -13688,69 +13688,8 @@
                   </a:extLst>
                 </a:hlinkClick>
               </a:rPr>
-              <a:t>https://</a:t>
+              <a:t>https://github.com/MCI/Combating MCI using Carrier Sensing</a:t>
             </a:r>
-            <a:r>
-              <a:rPr lang="en-US" sz="1100" u="sng" dirty="0" err="1">
-                <a:solidFill>
-                  <a:schemeClr val="tx2"/>
-                </a:solidFill>
-                <a:hlinkClick r:id="rId4">
-                  <a:extLst>
-                    <a:ext uri="{A12FA001-AC4F-418D-AE19-62706E023703}">
-                      <ahyp:hlinkClr xmlns:ahyp="http://schemas.microsoft.com/office/drawing/2018/hyperlinkcolor" val="tx"/>
-                    </a:ext>
-                  </a:extLst>
-                </a:hlinkClick>
-              </a:rPr>
-              <a:t>github.com</a:t>
-            </a:r>
-            <a:r>
-              <a:rPr lang="en-US" sz="1100" u="sng" dirty="0">
-                <a:solidFill>
-                  <a:schemeClr val="tx2"/>
-                </a:solidFill>
-                <a:hlinkClick r:id="rId4">
-                  <a:extLst>
-                    <a:ext uri="{A12FA001-AC4F-418D-AE19-62706E023703}">
-                      <ahyp:hlinkClr xmlns:ahyp="http://schemas.microsoft.com/office/drawing/2018/hyperlinkcolor" val="tx"/>
-                    </a:ext>
-                  </a:extLst>
-                </a:hlinkClick>
-              </a:rPr>
-              <a:t>/MCI/</a:t>
-            </a:r>
-            <a:r>
-              <a:rPr lang="en-US" sz="1100" u="sng" dirty="0" err="1">
-                <a:solidFill>
-                  <a:schemeClr val="tx2"/>
-                </a:solidFill>
-                <a:hlinkClick r:id="rId4">
-                  <a:extLst>
-                    <a:ext uri="{A12FA001-AC4F-418D-AE19-62706E023703}">
-                      <ahyp:hlinkClr xmlns:ahyp="http://schemas.microsoft.com/office/drawing/2018/hyperlinkcolor" val="tx"/>
-                    </a:ext>
-                  </a:extLst>
-                </a:hlinkClick>
-              </a:rPr>
-              <a:t>Combating_MCI_Using_CSMA.pptx</a:t>
-            </a:r>
-            <a:endParaRPr sz="1100" dirty="0">
-              <a:solidFill>
-                <a:schemeClr val="tx2"/>
-              </a:solidFill>
-            </a:endParaRPr>
-          </a:p>
-          <a:p>
-            <a:pPr marL="0" lvl="0" indent="0" algn="l" rtl="0">
-              <a:spcBef>
-                <a:spcPts val="0"/>
-              </a:spcBef>
-              <a:spcAft>
-                <a:spcPts val="0"/>
-              </a:spcAft>
-              <a:buNone/>
-            </a:pPr>
             <a:endParaRPr sz="1100" dirty="0">
               <a:solidFill>
                 <a:schemeClr val="tx2"/>

</xml_diff>

<commit_message>
Add final ppt and pdf files
</commit_message>
<xml_diff>
--- a/Combating MCI using Carrier Sensing.pptx
+++ b/Combating MCI using Carrier Sensing.pptx
@@ -5,7 +5,7 @@
     <p:sldMasterId id="2147483659" r:id="rId1"/>
   </p:sldMasterIdLst>
   <p:notesMasterIdLst>
-    <p:notesMasterId r:id="rId18"/>
+    <p:notesMasterId r:id="rId29"/>
   </p:notesMasterIdLst>
   <p:sldIdLst>
     <p:sldId id="256" r:id="rId2"/>
@@ -23,7 +23,18 @@
     <p:sldId id="272" r:id="rId14"/>
     <p:sldId id="273" r:id="rId15"/>
     <p:sldId id="274" r:id="rId16"/>
-    <p:sldId id="275" r:id="rId17"/>
+    <p:sldId id="276" r:id="rId17"/>
+    <p:sldId id="277" r:id="rId18"/>
+    <p:sldId id="279" r:id="rId19"/>
+    <p:sldId id="281" r:id="rId20"/>
+    <p:sldId id="282" r:id="rId21"/>
+    <p:sldId id="283" r:id="rId22"/>
+    <p:sldId id="284" r:id="rId23"/>
+    <p:sldId id="285" r:id="rId24"/>
+    <p:sldId id="286" r:id="rId25"/>
+    <p:sldId id="288" r:id="rId26"/>
+    <p:sldId id="275" r:id="rId27"/>
+    <p:sldId id="289" r:id="rId28"/>
   </p:sldIdLst>
   <p:sldSz cx="9144000" cy="6858000" type="screen4x3"/>
   <p:notesSz cx="6858000" cy="9144000"/>
@@ -1442,6 +1453,764 @@
   <p:cSld>
     <p:spTree>
       <p:nvGrpSpPr>
+        <p:cNvPr id="1" name="Shape 180"/>
+        <p:cNvGrpSpPr/>
+        <p:nvPr/>
+      </p:nvGrpSpPr>
+      <p:grpSpPr>
+        <a:xfrm>
+          <a:off x="0" y="0"/>
+          <a:ext cx="0" cy="0"/>
+          <a:chOff x="0" y="0"/>
+          <a:chExt cx="0" cy="0"/>
+        </a:xfrm>
+      </p:grpSpPr>
+      <p:sp>
+        <p:nvSpPr>
+          <p:cNvPr id="181" name="Google Shape;181;ga673c11f39_0_27:notes"/>
+          <p:cNvSpPr>
+            <a:spLocks noGrp="1" noRot="1" noChangeAspect="1"/>
+          </p:cNvSpPr>
+          <p:nvPr>
+            <p:ph type="sldImg" idx="2"/>
+          </p:nvPr>
+        </p:nvSpPr>
+        <p:spPr>
+          <a:xfrm>
+            <a:off x="1143000" y="685800"/>
+            <a:ext cx="4572000" cy="3429000"/>
+          </a:xfrm>
+          <a:custGeom>
+            <a:avLst/>
+            <a:gdLst/>
+            <a:ahLst/>
+            <a:cxnLst/>
+            <a:rect l="l" t="t" r="r" b="b"/>
+            <a:pathLst>
+              <a:path w="120000" h="120000" extrusionOk="0">
+                <a:moveTo>
+                  <a:pt x="0" y="0"/>
+                </a:moveTo>
+                <a:lnTo>
+                  <a:pt x="120000" y="0"/>
+                </a:lnTo>
+                <a:lnTo>
+                  <a:pt x="120000" y="120000"/>
+                </a:lnTo>
+                <a:lnTo>
+                  <a:pt x="0" y="120000"/>
+                </a:lnTo>
+                <a:close/>
+              </a:path>
+            </a:pathLst>
+          </a:custGeom>
+        </p:spPr>
+      </p:sp>
+      <p:sp>
+        <p:nvSpPr>
+          <p:cNvPr id="182" name="Google Shape;182;ga673c11f39_0_27:notes"/>
+          <p:cNvSpPr txBox="1">
+            <a:spLocks noGrp="1"/>
+          </p:cNvSpPr>
+          <p:nvPr>
+            <p:ph type="body" idx="1"/>
+          </p:nvPr>
+        </p:nvSpPr>
+        <p:spPr>
+          <a:xfrm>
+            <a:off x="685800" y="4343400"/>
+            <a:ext cx="5486400" cy="4114800"/>
+          </a:xfrm>
+          <a:prstGeom prst="rect">
+            <a:avLst/>
+          </a:prstGeom>
+        </p:spPr>
+        <p:txBody>
+          <a:bodyPr spcFirstLastPara="1" wrap="square" lIns="91425" tIns="91425" rIns="91425" bIns="91425" anchor="t" anchorCtr="0">
+            <a:noAutofit/>
+          </a:bodyPr>
+          <a:lstStyle/>
+          <a:p>
+            <a:pPr marL="0" lvl="0" indent="0" algn="l" rtl="0">
+              <a:spcBef>
+                <a:spcPts val="0"/>
+              </a:spcBef>
+              <a:spcAft>
+                <a:spcPts val="0"/>
+              </a:spcAft>
+              <a:buNone/>
+            </a:pPr>
+            <a:endParaRPr/>
+          </a:p>
+        </p:txBody>
+      </p:sp>
+    </p:spTree>
+    <p:extLst>
+      <p:ext uri="{BB962C8B-B14F-4D97-AF65-F5344CB8AC3E}">
+        <p14:creationId xmlns:p14="http://schemas.microsoft.com/office/powerpoint/2010/main" val="2876627712"/>
+      </p:ext>
+    </p:extLst>
+  </p:cSld>
+  <p:clrMapOvr>
+    <a:masterClrMapping/>
+  </p:clrMapOvr>
+</p:notes>
+</file>
+
+<file path=ppt/notesSlides/notesSlide17.xml><?xml version="1.0" encoding="utf-8"?>
+<p:notes xmlns:a="http://schemas.openxmlformats.org/drawingml/2006/main" xmlns:r="http://schemas.openxmlformats.org/officeDocument/2006/relationships" xmlns:p="http://schemas.openxmlformats.org/presentationml/2006/main" showMasterSp="0" showMasterPhAnim="0">
+  <p:cSld>
+    <p:spTree>
+      <p:nvGrpSpPr>
+        <p:cNvPr id="1" name="Shape 180"/>
+        <p:cNvGrpSpPr/>
+        <p:nvPr/>
+      </p:nvGrpSpPr>
+      <p:grpSpPr>
+        <a:xfrm>
+          <a:off x="0" y="0"/>
+          <a:ext cx="0" cy="0"/>
+          <a:chOff x="0" y="0"/>
+          <a:chExt cx="0" cy="0"/>
+        </a:xfrm>
+      </p:grpSpPr>
+      <p:sp>
+        <p:nvSpPr>
+          <p:cNvPr id="181" name="Google Shape;181;ga673c11f39_0_27:notes"/>
+          <p:cNvSpPr>
+            <a:spLocks noGrp="1" noRot="1" noChangeAspect="1"/>
+          </p:cNvSpPr>
+          <p:nvPr>
+            <p:ph type="sldImg" idx="2"/>
+          </p:nvPr>
+        </p:nvSpPr>
+        <p:spPr>
+          <a:xfrm>
+            <a:off x="1143000" y="685800"/>
+            <a:ext cx="4572000" cy="3429000"/>
+          </a:xfrm>
+          <a:custGeom>
+            <a:avLst/>
+            <a:gdLst/>
+            <a:ahLst/>
+            <a:cxnLst/>
+            <a:rect l="l" t="t" r="r" b="b"/>
+            <a:pathLst>
+              <a:path w="120000" h="120000" extrusionOk="0">
+                <a:moveTo>
+                  <a:pt x="0" y="0"/>
+                </a:moveTo>
+                <a:lnTo>
+                  <a:pt x="120000" y="0"/>
+                </a:lnTo>
+                <a:lnTo>
+                  <a:pt x="120000" y="120000"/>
+                </a:lnTo>
+                <a:lnTo>
+                  <a:pt x="0" y="120000"/>
+                </a:lnTo>
+                <a:close/>
+              </a:path>
+            </a:pathLst>
+          </a:custGeom>
+        </p:spPr>
+      </p:sp>
+      <p:sp>
+        <p:nvSpPr>
+          <p:cNvPr id="182" name="Google Shape;182;ga673c11f39_0_27:notes"/>
+          <p:cNvSpPr txBox="1">
+            <a:spLocks noGrp="1"/>
+          </p:cNvSpPr>
+          <p:nvPr>
+            <p:ph type="body" idx="1"/>
+          </p:nvPr>
+        </p:nvSpPr>
+        <p:spPr>
+          <a:xfrm>
+            <a:off x="685800" y="4343400"/>
+            <a:ext cx="5486400" cy="4114800"/>
+          </a:xfrm>
+          <a:prstGeom prst="rect">
+            <a:avLst/>
+          </a:prstGeom>
+        </p:spPr>
+        <p:txBody>
+          <a:bodyPr spcFirstLastPara="1" wrap="square" lIns="91425" tIns="91425" rIns="91425" bIns="91425" anchor="t" anchorCtr="0">
+            <a:noAutofit/>
+          </a:bodyPr>
+          <a:lstStyle/>
+          <a:p>
+            <a:pPr marL="0" lvl="0" indent="0" algn="l" rtl="0">
+              <a:spcBef>
+                <a:spcPts val="0"/>
+              </a:spcBef>
+              <a:spcAft>
+                <a:spcPts val="0"/>
+              </a:spcAft>
+              <a:buNone/>
+            </a:pPr>
+            <a:endParaRPr/>
+          </a:p>
+        </p:txBody>
+      </p:sp>
+    </p:spTree>
+    <p:extLst>
+      <p:ext uri="{BB962C8B-B14F-4D97-AF65-F5344CB8AC3E}">
+        <p14:creationId xmlns:p14="http://schemas.microsoft.com/office/powerpoint/2010/main" val="1498903455"/>
+      </p:ext>
+    </p:extLst>
+  </p:cSld>
+  <p:clrMapOvr>
+    <a:masterClrMapping/>
+  </p:clrMapOvr>
+</p:notes>
+</file>
+
+<file path=ppt/notesSlides/notesSlide18.xml><?xml version="1.0" encoding="utf-8"?>
+<p:notes xmlns:a="http://schemas.openxmlformats.org/drawingml/2006/main" xmlns:r="http://schemas.openxmlformats.org/officeDocument/2006/relationships" xmlns:p="http://schemas.openxmlformats.org/presentationml/2006/main" showMasterSp="0" showMasterPhAnim="0">
+  <p:cSld>
+    <p:spTree>
+      <p:nvGrpSpPr>
+        <p:cNvPr id="1" name="Shape 180"/>
+        <p:cNvGrpSpPr/>
+        <p:nvPr/>
+      </p:nvGrpSpPr>
+      <p:grpSpPr>
+        <a:xfrm>
+          <a:off x="0" y="0"/>
+          <a:ext cx="0" cy="0"/>
+          <a:chOff x="0" y="0"/>
+          <a:chExt cx="0" cy="0"/>
+        </a:xfrm>
+      </p:grpSpPr>
+      <p:sp>
+        <p:nvSpPr>
+          <p:cNvPr id="181" name="Google Shape;181;ga673c11f39_0_27:notes"/>
+          <p:cNvSpPr>
+            <a:spLocks noGrp="1" noRot="1" noChangeAspect="1"/>
+          </p:cNvSpPr>
+          <p:nvPr>
+            <p:ph type="sldImg" idx="2"/>
+          </p:nvPr>
+        </p:nvSpPr>
+        <p:spPr>
+          <a:xfrm>
+            <a:off x="1143000" y="685800"/>
+            <a:ext cx="4572000" cy="3429000"/>
+          </a:xfrm>
+          <a:custGeom>
+            <a:avLst/>
+            <a:gdLst/>
+            <a:ahLst/>
+            <a:cxnLst/>
+            <a:rect l="l" t="t" r="r" b="b"/>
+            <a:pathLst>
+              <a:path w="120000" h="120000" extrusionOk="0">
+                <a:moveTo>
+                  <a:pt x="0" y="0"/>
+                </a:moveTo>
+                <a:lnTo>
+                  <a:pt x="120000" y="0"/>
+                </a:lnTo>
+                <a:lnTo>
+                  <a:pt x="120000" y="120000"/>
+                </a:lnTo>
+                <a:lnTo>
+                  <a:pt x="0" y="120000"/>
+                </a:lnTo>
+                <a:close/>
+              </a:path>
+            </a:pathLst>
+          </a:custGeom>
+        </p:spPr>
+      </p:sp>
+      <p:sp>
+        <p:nvSpPr>
+          <p:cNvPr id="182" name="Google Shape;182;ga673c11f39_0_27:notes"/>
+          <p:cNvSpPr txBox="1">
+            <a:spLocks noGrp="1"/>
+          </p:cNvSpPr>
+          <p:nvPr>
+            <p:ph type="body" idx="1"/>
+          </p:nvPr>
+        </p:nvSpPr>
+        <p:spPr>
+          <a:xfrm>
+            <a:off x="685800" y="4343400"/>
+            <a:ext cx="5486400" cy="4114800"/>
+          </a:xfrm>
+          <a:prstGeom prst="rect">
+            <a:avLst/>
+          </a:prstGeom>
+        </p:spPr>
+        <p:txBody>
+          <a:bodyPr spcFirstLastPara="1" wrap="square" lIns="91425" tIns="91425" rIns="91425" bIns="91425" anchor="t" anchorCtr="0">
+            <a:noAutofit/>
+          </a:bodyPr>
+          <a:lstStyle/>
+          <a:p>
+            <a:pPr marL="0" lvl="0" indent="0" algn="l" rtl="0">
+              <a:spcBef>
+                <a:spcPts val="0"/>
+              </a:spcBef>
+              <a:spcAft>
+                <a:spcPts val="0"/>
+              </a:spcAft>
+              <a:buNone/>
+            </a:pPr>
+            <a:endParaRPr/>
+          </a:p>
+        </p:txBody>
+      </p:sp>
+    </p:spTree>
+    <p:extLst>
+      <p:ext uri="{BB962C8B-B14F-4D97-AF65-F5344CB8AC3E}">
+        <p14:creationId xmlns:p14="http://schemas.microsoft.com/office/powerpoint/2010/main" val="2348721649"/>
+      </p:ext>
+    </p:extLst>
+  </p:cSld>
+  <p:clrMapOvr>
+    <a:masterClrMapping/>
+  </p:clrMapOvr>
+</p:notes>
+</file>
+
+<file path=ppt/notesSlides/notesSlide19.xml><?xml version="1.0" encoding="utf-8"?>
+<p:notes xmlns:a="http://schemas.openxmlformats.org/drawingml/2006/main" xmlns:r="http://schemas.openxmlformats.org/officeDocument/2006/relationships" xmlns:p="http://schemas.openxmlformats.org/presentationml/2006/main" showMasterSp="0" showMasterPhAnim="0">
+  <p:cSld>
+    <p:spTree>
+      <p:nvGrpSpPr>
+        <p:cNvPr id="1" name="Shape 180"/>
+        <p:cNvGrpSpPr/>
+        <p:nvPr/>
+      </p:nvGrpSpPr>
+      <p:grpSpPr>
+        <a:xfrm>
+          <a:off x="0" y="0"/>
+          <a:ext cx="0" cy="0"/>
+          <a:chOff x="0" y="0"/>
+          <a:chExt cx="0" cy="0"/>
+        </a:xfrm>
+      </p:grpSpPr>
+      <p:sp>
+        <p:nvSpPr>
+          <p:cNvPr id="181" name="Google Shape;181;ga673c11f39_0_27:notes"/>
+          <p:cNvSpPr>
+            <a:spLocks noGrp="1" noRot="1" noChangeAspect="1"/>
+          </p:cNvSpPr>
+          <p:nvPr>
+            <p:ph type="sldImg" idx="2"/>
+          </p:nvPr>
+        </p:nvSpPr>
+        <p:spPr>
+          <a:xfrm>
+            <a:off x="1143000" y="685800"/>
+            <a:ext cx="4572000" cy="3429000"/>
+          </a:xfrm>
+          <a:custGeom>
+            <a:avLst/>
+            <a:gdLst/>
+            <a:ahLst/>
+            <a:cxnLst/>
+            <a:rect l="l" t="t" r="r" b="b"/>
+            <a:pathLst>
+              <a:path w="120000" h="120000" extrusionOk="0">
+                <a:moveTo>
+                  <a:pt x="0" y="0"/>
+                </a:moveTo>
+                <a:lnTo>
+                  <a:pt x="120000" y="0"/>
+                </a:lnTo>
+                <a:lnTo>
+                  <a:pt x="120000" y="120000"/>
+                </a:lnTo>
+                <a:lnTo>
+                  <a:pt x="0" y="120000"/>
+                </a:lnTo>
+                <a:close/>
+              </a:path>
+            </a:pathLst>
+          </a:custGeom>
+        </p:spPr>
+      </p:sp>
+      <p:sp>
+        <p:nvSpPr>
+          <p:cNvPr id="182" name="Google Shape;182;ga673c11f39_0_27:notes"/>
+          <p:cNvSpPr txBox="1">
+            <a:spLocks noGrp="1"/>
+          </p:cNvSpPr>
+          <p:nvPr>
+            <p:ph type="body" idx="1"/>
+          </p:nvPr>
+        </p:nvSpPr>
+        <p:spPr>
+          <a:xfrm>
+            <a:off x="685800" y="4343400"/>
+            <a:ext cx="5486400" cy="4114800"/>
+          </a:xfrm>
+          <a:prstGeom prst="rect">
+            <a:avLst/>
+          </a:prstGeom>
+        </p:spPr>
+        <p:txBody>
+          <a:bodyPr spcFirstLastPara="1" wrap="square" lIns="91425" tIns="91425" rIns="91425" bIns="91425" anchor="t" anchorCtr="0">
+            <a:noAutofit/>
+          </a:bodyPr>
+          <a:lstStyle/>
+          <a:p>
+            <a:pPr marL="0" lvl="0" indent="0" algn="l" rtl="0">
+              <a:spcBef>
+                <a:spcPts val="0"/>
+              </a:spcBef>
+              <a:spcAft>
+                <a:spcPts val="0"/>
+              </a:spcAft>
+              <a:buNone/>
+            </a:pPr>
+            <a:endParaRPr/>
+          </a:p>
+        </p:txBody>
+      </p:sp>
+    </p:spTree>
+    <p:extLst>
+      <p:ext uri="{BB962C8B-B14F-4D97-AF65-F5344CB8AC3E}">
+        <p14:creationId xmlns:p14="http://schemas.microsoft.com/office/powerpoint/2010/main" val="107396016"/>
+      </p:ext>
+    </p:extLst>
+  </p:cSld>
+  <p:clrMapOvr>
+    <a:masterClrMapping/>
+  </p:clrMapOvr>
+</p:notes>
+</file>
+
+<file path=ppt/notesSlides/notesSlide2.xml><?xml version="1.0" encoding="utf-8"?>
+<p:notes xmlns:a="http://schemas.openxmlformats.org/drawingml/2006/main" xmlns:r="http://schemas.openxmlformats.org/officeDocument/2006/relationships" xmlns:p="http://schemas.openxmlformats.org/presentationml/2006/main" showMasterSp="0" showMasterPhAnim="0">
+  <p:cSld>
+    <p:spTree>
+      <p:nvGrpSpPr>
+        <p:cNvPr id="1" name="Shape 79"/>
+        <p:cNvGrpSpPr/>
+        <p:nvPr/>
+      </p:nvGrpSpPr>
+      <p:grpSpPr>
+        <a:xfrm>
+          <a:off x="0" y="0"/>
+          <a:ext cx="0" cy="0"/>
+          <a:chOff x="0" y="0"/>
+          <a:chExt cx="0" cy="0"/>
+        </a:xfrm>
+      </p:grpSpPr>
+      <p:sp>
+        <p:nvSpPr>
+          <p:cNvPr id="80" name="Google Shape;80;g9fba8988d4_0_0:notes"/>
+          <p:cNvSpPr>
+            <a:spLocks noGrp="1" noRot="1" noChangeAspect="1"/>
+          </p:cNvSpPr>
+          <p:nvPr>
+            <p:ph type="sldImg" idx="2"/>
+          </p:nvPr>
+        </p:nvSpPr>
+        <p:spPr>
+          <a:xfrm>
+            <a:off x="1143000" y="685800"/>
+            <a:ext cx="4572000" cy="3429000"/>
+          </a:xfrm>
+          <a:custGeom>
+            <a:avLst/>
+            <a:gdLst/>
+            <a:ahLst/>
+            <a:cxnLst/>
+            <a:rect l="l" t="t" r="r" b="b"/>
+            <a:pathLst>
+              <a:path w="120000" h="120000" extrusionOk="0">
+                <a:moveTo>
+                  <a:pt x="0" y="0"/>
+                </a:moveTo>
+                <a:lnTo>
+                  <a:pt x="120000" y="0"/>
+                </a:lnTo>
+                <a:lnTo>
+                  <a:pt x="120000" y="120000"/>
+                </a:lnTo>
+                <a:lnTo>
+                  <a:pt x="0" y="120000"/>
+                </a:lnTo>
+                <a:close/>
+              </a:path>
+            </a:pathLst>
+          </a:custGeom>
+        </p:spPr>
+      </p:sp>
+      <p:sp>
+        <p:nvSpPr>
+          <p:cNvPr id="81" name="Google Shape;81;g9fba8988d4_0_0:notes"/>
+          <p:cNvSpPr txBox="1">
+            <a:spLocks noGrp="1"/>
+          </p:cNvSpPr>
+          <p:nvPr>
+            <p:ph type="body" idx="1"/>
+          </p:nvPr>
+        </p:nvSpPr>
+        <p:spPr>
+          <a:xfrm>
+            <a:off x="685800" y="4343400"/>
+            <a:ext cx="5486400" cy="4114800"/>
+          </a:xfrm>
+          <a:prstGeom prst="rect">
+            <a:avLst/>
+          </a:prstGeom>
+        </p:spPr>
+        <p:txBody>
+          <a:bodyPr spcFirstLastPara="1" wrap="square" lIns="91425" tIns="91425" rIns="91425" bIns="91425" anchor="t" anchorCtr="0">
+            <a:noAutofit/>
+          </a:bodyPr>
+          <a:lstStyle/>
+          <a:p>
+            <a:pPr marL="0" lvl="0" indent="0" algn="l" rtl="0">
+              <a:spcBef>
+                <a:spcPts val="0"/>
+              </a:spcBef>
+              <a:spcAft>
+                <a:spcPts val="0"/>
+              </a:spcAft>
+              <a:buNone/>
+            </a:pPr>
+            <a:endParaRPr/>
+          </a:p>
+        </p:txBody>
+      </p:sp>
+    </p:spTree>
+  </p:cSld>
+  <p:clrMapOvr>
+    <a:masterClrMapping/>
+  </p:clrMapOvr>
+</p:notes>
+</file>
+
+<file path=ppt/notesSlides/notesSlide20.xml><?xml version="1.0" encoding="utf-8"?>
+<p:notes xmlns:a="http://schemas.openxmlformats.org/drawingml/2006/main" xmlns:r="http://schemas.openxmlformats.org/officeDocument/2006/relationships" xmlns:p="http://schemas.openxmlformats.org/presentationml/2006/main" showMasterSp="0" showMasterPhAnim="0">
+  <p:cSld>
+    <p:spTree>
+      <p:nvGrpSpPr>
+        <p:cNvPr id="1" name="Shape 180"/>
+        <p:cNvGrpSpPr/>
+        <p:nvPr/>
+      </p:nvGrpSpPr>
+      <p:grpSpPr>
+        <a:xfrm>
+          <a:off x="0" y="0"/>
+          <a:ext cx="0" cy="0"/>
+          <a:chOff x="0" y="0"/>
+          <a:chExt cx="0" cy="0"/>
+        </a:xfrm>
+      </p:grpSpPr>
+      <p:sp>
+        <p:nvSpPr>
+          <p:cNvPr id="181" name="Google Shape;181;ga673c11f39_0_27:notes"/>
+          <p:cNvSpPr>
+            <a:spLocks noGrp="1" noRot="1" noChangeAspect="1"/>
+          </p:cNvSpPr>
+          <p:nvPr>
+            <p:ph type="sldImg" idx="2"/>
+          </p:nvPr>
+        </p:nvSpPr>
+        <p:spPr>
+          <a:xfrm>
+            <a:off x="1143000" y="685800"/>
+            <a:ext cx="4572000" cy="3429000"/>
+          </a:xfrm>
+          <a:custGeom>
+            <a:avLst/>
+            <a:gdLst/>
+            <a:ahLst/>
+            <a:cxnLst/>
+            <a:rect l="l" t="t" r="r" b="b"/>
+            <a:pathLst>
+              <a:path w="120000" h="120000" extrusionOk="0">
+                <a:moveTo>
+                  <a:pt x="0" y="0"/>
+                </a:moveTo>
+                <a:lnTo>
+                  <a:pt x="120000" y="0"/>
+                </a:lnTo>
+                <a:lnTo>
+                  <a:pt x="120000" y="120000"/>
+                </a:lnTo>
+                <a:lnTo>
+                  <a:pt x="0" y="120000"/>
+                </a:lnTo>
+                <a:close/>
+              </a:path>
+            </a:pathLst>
+          </a:custGeom>
+        </p:spPr>
+      </p:sp>
+      <p:sp>
+        <p:nvSpPr>
+          <p:cNvPr id="182" name="Google Shape;182;ga673c11f39_0_27:notes"/>
+          <p:cNvSpPr txBox="1">
+            <a:spLocks noGrp="1"/>
+          </p:cNvSpPr>
+          <p:nvPr>
+            <p:ph type="body" idx="1"/>
+          </p:nvPr>
+        </p:nvSpPr>
+        <p:spPr>
+          <a:xfrm>
+            <a:off x="685800" y="4343400"/>
+            <a:ext cx="5486400" cy="4114800"/>
+          </a:xfrm>
+          <a:prstGeom prst="rect">
+            <a:avLst/>
+          </a:prstGeom>
+        </p:spPr>
+        <p:txBody>
+          <a:bodyPr spcFirstLastPara="1" wrap="square" lIns="91425" tIns="91425" rIns="91425" bIns="91425" anchor="t" anchorCtr="0">
+            <a:noAutofit/>
+          </a:bodyPr>
+          <a:lstStyle/>
+          <a:p>
+            <a:pPr marL="0" lvl="0" indent="0" algn="l" rtl="0">
+              <a:spcBef>
+                <a:spcPts val="0"/>
+              </a:spcBef>
+              <a:spcAft>
+                <a:spcPts val="0"/>
+              </a:spcAft>
+              <a:buNone/>
+            </a:pPr>
+            <a:endParaRPr/>
+          </a:p>
+        </p:txBody>
+      </p:sp>
+    </p:spTree>
+    <p:extLst>
+      <p:ext uri="{BB962C8B-B14F-4D97-AF65-F5344CB8AC3E}">
+        <p14:creationId xmlns:p14="http://schemas.microsoft.com/office/powerpoint/2010/main" val="1444529691"/>
+      </p:ext>
+    </p:extLst>
+  </p:cSld>
+  <p:clrMapOvr>
+    <a:masterClrMapping/>
+  </p:clrMapOvr>
+</p:notes>
+</file>
+
+<file path=ppt/notesSlides/notesSlide21.xml><?xml version="1.0" encoding="utf-8"?>
+<p:notes xmlns:a="http://schemas.openxmlformats.org/drawingml/2006/main" xmlns:r="http://schemas.openxmlformats.org/officeDocument/2006/relationships" xmlns:p="http://schemas.openxmlformats.org/presentationml/2006/main" showMasterSp="0" showMasterPhAnim="0">
+  <p:cSld>
+    <p:spTree>
+      <p:nvGrpSpPr>
+        <p:cNvPr id="1" name="Shape 180"/>
+        <p:cNvGrpSpPr/>
+        <p:nvPr/>
+      </p:nvGrpSpPr>
+      <p:grpSpPr>
+        <a:xfrm>
+          <a:off x="0" y="0"/>
+          <a:ext cx="0" cy="0"/>
+          <a:chOff x="0" y="0"/>
+          <a:chExt cx="0" cy="0"/>
+        </a:xfrm>
+      </p:grpSpPr>
+      <p:sp>
+        <p:nvSpPr>
+          <p:cNvPr id="181" name="Google Shape;181;ga673c11f39_0_27:notes"/>
+          <p:cNvSpPr>
+            <a:spLocks noGrp="1" noRot="1" noChangeAspect="1"/>
+          </p:cNvSpPr>
+          <p:nvPr>
+            <p:ph type="sldImg" idx="2"/>
+          </p:nvPr>
+        </p:nvSpPr>
+        <p:spPr>
+          <a:xfrm>
+            <a:off x="1143000" y="685800"/>
+            <a:ext cx="4572000" cy="3429000"/>
+          </a:xfrm>
+          <a:custGeom>
+            <a:avLst/>
+            <a:gdLst/>
+            <a:ahLst/>
+            <a:cxnLst/>
+            <a:rect l="l" t="t" r="r" b="b"/>
+            <a:pathLst>
+              <a:path w="120000" h="120000" extrusionOk="0">
+                <a:moveTo>
+                  <a:pt x="0" y="0"/>
+                </a:moveTo>
+                <a:lnTo>
+                  <a:pt x="120000" y="0"/>
+                </a:lnTo>
+                <a:lnTo>
+                  <a:pt x="120000" y="120000"/>
+                </a:lnTo>
+                <a:lnTo>
+                  <a:pt x="0" y="120000"/>
+                </a:lnTo>
+                <a:close/>
+              </a:path>
+            </a:pathLst>
+          </a:custGeom>
+        </p:spPr>
+      </p:sp>
+      <p:sp>
+        <p:nvSpPr>
+          <p:cNvPr id="182" name="Google Shape;182;ga673c11f39_0_27:notes"/>
+          <p:cNvSpPr txBox="1">
+            <a:spLocks noGrp="1"/>
+          </p:cNvSpPr>
+          <p:nvPr>
+            <p:ph type="body" idx="1"/>
+          </p:nvPr>
+        </p:nvSpPr>
+        <p:spPr>
+          <a:xfrm>
+            <a:off x="685800" y="4343400"/>
+            <a:ext cx="5486400" cy="4114800"/>
+          </a:xfrm>
+          <a:prstGeom prst="rect">
+            <a:avLst/>
+          </a:prstGeom>
+        </p:spPr>
+        <p:txBody>
+          <a:bodyPr spcFirstLastPara="1" wrap="square" lIns="91425" tIns="91425" rIns="91425" bIns="91425" anchor="t" anchorCtr="0">
+            <a:noAutofit/>
+          </a:bodyPr>
+          <a:lstStyle/>
+          <a:p>
+            <a:pPr marL="0" lvl="0" indent="0" algn="l" rtl="0">
+              <a:spcBef>
+                <a:spcPts val="0"/>
+              </a:spcBef>
+              <a:spcAft>
+                <a:spcPts val="0"/>
+              </a:spcAft>
+              <a:buNone/>
+            </a:pPr>
+            <a:endParaRPr/>
+          </a:p>
+        </p:txBody>
+      </p:sp>
+    </p:spTree>
+    <p:extLst>
+      <p:ext uri="{BB962C8B-B14F-4D97-AF65-F5344CB8AC3E}">
+        <p14:creationId xmlns:p14="http://schemas.microsoft.com/office/powerpoint/2010/main" val="1696861649"/>
+      </p:ext>
+    </p:extLst>
+  </p:cSld>
+  <p:clrMapOvr>
+    <a:masterClrMapping/>
+  </p:clrMapOvr>
+</p:notes>
+</file>
+
+<file path=ppt/notesSlides/notesSlide22.xml><?xml version="1.0" encoding="utf-8"?>
+<p:notes xmlns:a="http://schemas.openxmlformats.org/drawingml/2006/main" xmlns:r="http://schemas.openxmlformats.org/officeDocument/2006/relationships" xmlns:p="http://schemas.openxmlformats.org/presentationml/2006/main" showMasterSp="0" showMasterPhAnim="0">
+  <p:cSld>
+    <p:spTree>
+      <p:nvGrpSpPr>
         <p:cNvPr id="1" name="Shape 214"/>
         <p:cNvGrpSpPr/>
         <p:nvPr/>
@@ -1534,6 +2303,11 @@
         </p:txBody>
       </p:sp>
     </p:spTree>
+    <p:extLst>
+      <p:ext uri="{BB962C8B-B14F-4D97-AF65-F5344CB8AC3E}">
+        <p14:creationId xmlns:p14="http://schemas.microsoft.com/office/powerpoint/2010/main" val="3696957077"/>
+      </p:ext>
+    </p:extLst>
   </p:cSld>
   <p:clrMapOvr>
     <a:masterClrMapping/>
@@ -1541,12 +2315,12 @@
 </p:notes>
 </file>
 
-<file path=ppt/notesSlides/notesSlide2.xml><?xml version="1.0" encoding="utf-8"?>
+<file path=ppt/notesSlides/notesSlide23.xml><?xml version="1.0" encoding="utf-8"?>
 <p:notes xmlns:a="http://schemas.openxmlformats.org/drawingml/2006/main" xmlns:r="http://schemas.openxmlformats.org/officeDocument/2006/relationships" xmlns:p="http://schemas.openxmlformats.org/presentationml/2006/main" showMasterSp="0" showMasterPhAnim="0">
   <p:cSld>
     <p:spTree>
       <p:nvGrpSpPr>
-        <p:cNvPr id="1" name="Shape 79"/>
+        <p:cNvPr id="1" name="Shape 214"/>
         <p:cNvGrpSpPr/>
         <p:nvPr/>
       </p:nvGrpSpPr>
@@ -1560,7 +2334,7 @@
       </p:grpSpPr>
       <p:sp>
         <p:nvSpPr>
-          <p:cNvPr id="80" name="Google Shape;80;g9fba8988d4_0_0:notes"/>
+          <p:cNvPr id="215" name="Google Shape;215;ga673c11f39_0_51:notes"/>
           <p:cNvSpPr>
             <a:spLocks noGrp="1" noRot="1" noChangeAspect="1"/>
           </p:cNvSpPr>
@@ -1601,7 +2375,7 @@
       </p:sp>
       <p:sp>
         <p:nvSpPr>
-          <p:cNvPr id="81" name="Google Shape;81;g9fba8988d4_0_0:notes"/>
+          <p:cNvPr id="216" name="Google Shape;216;ga673c11f39_0_51:notes"/>
           <p:cNvSpPr txBox="1">
             <a:spLocks noGrp="1"/>
           </p:cNvSpPr>
@@ -14946,10 +15720,10 @@
               <a:buChar char="•"/>
             </a:pPr>
             <a:r>
-              <a:rPr lang="en-US" sz="1700"/>
+              <a:rPr lang="en-US" sz="1700" dirty="0"/>
               <a:t>Comparison Baselines:</a:t>
             </a:r>
-            <a:endParaRPr sz="1700"/>
+            <a:endParaRPr sz="1700" dirty="0"/>
           </a:p>
           <a:p>
             <a:pPr marL="914400" lvl="1" indent="-317500" algn="l" rtl="0">
@@ -14963,10 +15737,18 @@
               <a:buChar char="•"/>
             </a:pPr>
             <a:r>
-              <a:rPr lang="en-US" sz="1400"/>
-              <a:t>PN (Pseudonoise): Uses non-sinusoid modulation and demodulation functions. </a:t>
-            </a:r>
-            <a:endParaRPr sz="1400"/>
+              <a:rPr lang="en-US" sz="1400" dirty="0"/>
+              <a:t>PN (</a:t>
+            </a:r>
+            <a:r>
+              <a:rPr lang="en-US" sz="1400" dirty="0" err="1"/>
+              <a:t>Pseudonoise</a:t>
+            </a:r>
+            <a:r>
+              <a:rPr lang="en-US" sz="1400" dirty="0"/>
+              <a:t>): Uses non-sinusoid modulation and demodulation functions. </a:t>
+            </a:r>
+            <a:endParaRPr sz="1400" dirty="0"/>
           </a:p>
           <a:p>
             <a:pPr marL="914400" lvl="1" indent="-317500" algn="l" rtl="0">
@@ -14980,10 +15762,10 @@
               <a:buChar char="•"/>
             </a:pPr>
             <a:r>
-              <a:rPr lang="en-US" sz="1400"/>
+              <a:rPr lang="en-US" sz="1400" dirty="0"/>
               <a:t>ACO (AC Orthogonal): Using orthogonal frequencies for the interfering cameras. </a:t>
             </a:r>
-            <a:endParaRPr sz="1400"/>
+            <a:endParaRPr sz="1400" dirty="0"/>
           </a:p>
           <a:p>
             <a:pPr marL="914400" lvl="1" indent="-317500" algn="l" rtl="0">
@@ -14997,10 +15779,10 @@
               <a:buChar char="•"/>
             </a:pPr>
             <a:r>
-              <a:rPr lang="en-US" sz="1400"/>
+              <a:rPr lang="en-US" sz="1400" dirty="0"/>
               <a:t>SEC (Stochastic Exposure Coding): Makes use of a stochastic TDMA protocol</a:t>
             </a:r>
-            <a:endParaRPr sz="1400"/>
+            <a:endParaRPr sz="1400" dirty="0"/>
           </a:p>
           <a:p>
             <a:pPr marL="914400" lvl="1" indent="-317500" algn="l" rtl="0">
@@ -15014,10 +15796,10 @@
               <a:buChar char="•"/>
             </a:pPr>
             <a:r>
-              <a:rPr lang="en-US" sz="1400"/>
+              <a:rPr lang="en-US" sz="1400" dirty="0"/>
               <a:t>CMB: Combined ACO and SEC</a:t>
             </a:r>
-            <a:endParaRPr sz="1400"/>
+            <a:endParaRPr sz="1400" dirty="0"/>
           </a:p>
           <a:p>
             <a:pPr marL="914400" lvl="1" indent="-317500" algn="l" rtl="0">
@@ -15031,10 +15813,10 @@
               <a:buChar char="•"/>
             </a:pPr>
             <a:r>
-              <a:rPr lang="en-US" sz="1400"/>
+              <a:rPr lang="en-US" sz="1400" dirty="0"/>
               <a:t>CSMA: Intervention to use a-priori carrier sensing</a:t>
             </a:r>
-            <a:endParaRPr sz="1400"/>
+            <a:endParaRPr sz="1400" dirty="0"/>
           </a:p>
           <a:p>
             <a:pPr marL="457200" lvl="0" indent="-317500" algn="l" rtl="0">
@@ -15048,22 +15830,26 @@
               <a:buChar char="•"/>
             </a:pPr>
             <a:r>
-              <a:rPr lang="en-US" sz="1400"/>
+              <a:rPr lang="en-US" sz="1400" dirty="0"/>
               <a:t>Following results are for CSMA approach using the </a:t>
             </a:r>
             <a:r>
-              <a:rPr lang="en-US" sz="1400" b="1"/>
+              <a:rPr lang="en-US" sz="1400" b="1" dirty="0"/>
               <a:t>half Power Amplification as SEC </a:t>
             </a:r>
             <a:r>
-              <a:rPr lang="en-US" sz="1400"/>
+              <a:rPr lang="en-US" sz="1400" dirty="0"/>
               <a:t>and</a:t>
             </a:r>
             <a:r>
-              <a:rPr lang="en-US" sz="1400" b="1"/>
-              <a:t> 10% increase in probability p_CMB</a:t>
-            </a:r>
-            <a:endParaRPr sz="1400"/>
+              <a:rPr lang="en-US" sz="1400" b="1" dirty="0"/>
+              <a:t> 10% increase in probability </a:t>
+            </a:r>
+            <a:r>
+              <a:rPr lang="en-US" sz="1400" b="1" dirty="0" err="1"/>
+              <a:t>p_CMB</a:t>
+            </a:r>
+            <a:endParaRPr sz="1400" dirty="0"/>
           </a:p>
         </p:txBody>
       </p:sp>
@@ -15349,7 +16135,7 @@
   <p:cSld>
     <p:spTree>
       <p:nvGrpSpPr>
-        <p:cNvPr id="1" name="Shape 217"/>
+        <p:cNvPr id="1" name=""/>
         <p:cNvGrpSpPr/>
         <p:nvPr/>
       </p:nvGrpSpPr>
@@ -15363,7 +16149,715 @@
       </p:grpSpPr>
       <p:sp>
         <p:nvSpPr>
-          <p:cNvPr id="218" name="Google Shape;218;p32"/>
+          <p:cNvPr id="2" name="Title 1">
+            <a:extLst>
+              <a:ext uri="{FF2B5EF4-FFF2-40B4-BE49-F238E27FC236}">
+                <a16:creationId xmlns:a16="http://schemas.microsoft.com/office/drawing/2014/main" id="{BDF349D1-7993-EA49-B3A4-3D4B5DBEC071}"/>
+              </a:ext>
+            </a:extLst>
+          </p:cNvPr>
+          <p:cNvSpPr>
+            <a:spLocks noGrp="1"/>
+          </p:cNvSpPr>
+          <p:nvPr>
+            <p:ph type="title"/>
+          </p:nvPr>
+        </p:nvSpPr>
+        <p:spPr/>
+        <p:txBody>
+          <a:bodyPr/>
+          <a:lstStyle/>
+          <a:p>
+            <a:r>
+              <a:rPr lang="en-US" dirty="0"/>
+              <a:t>Simulating Real Time Scenarios</a:t>
+            </a:r>
+          </a:p>
+        </p:txBody>
+      </p:sp>
+      <p:sp>
+        <p:nvSpPr>
+          <p:cNvPr id="3" name="Text Placeholder 2">
+            <a:extLst>
+              <a:ext uri="{FF2B5EF4-FFF2-40B4-BE49-F238E27FC236}">
+                <a16:creationId xmlns:a16="http://schemas.microsoft.com/office/drawing/2014/main" id="{68DCB929-232E-CE4E-9D8D-D7494798277E}"/>
+              </a:ext>
+            </a:extLst>
+          </p:cNvPr>
+          <p:cNvSpPr>
+            <a:spLocks noGrp="1"/>
+          </p:cNvSpPr>
+          <p:nvPr>
+            <p:ph type="body" idx="1"/>
+          </p:nvPr>
+        </p:nvSpPr>
+        <p:spPr/>
+        <p:txBody>
+          <a:bodyPr/>
+          <a:lstStyle/>
+          <a:p>
+            <a:r>
+              <a:rPr lang="en-US" dirty="0"/>
+              <a:t>The previous algorithm does </a:t>
+            </a:r>
+            <a:r>
+              <a:rPr lang="en-US" i="1" dirty="0"/>
+              <a:t>carrier sensing</a:t>
+            </a:r>
+            <a:r>
+              <a:rPr lang="en-US" dirty="0"/>
+              <a:t> and </a:t>
+            </a:r>
+            <a:r>
+              <a:rPr lang="en-US" i="1" dirty="0"/>
+              <a:t>depth estimation</a:t>
+            </a:r>
+            <a:r>
+              <a:rPr lang="en-US" dirty="0"/>
+              <a:t> in the same slot. </a:t>
+            </a:r>
+          </a:p>
+          <a:p>
+            <a:r>
+              <a:rPr lang="en-US" dirty="0"/>
+              <a:t>In reality, if we employ carrier sensing in every slot, the duration for depth estimation decreases. </a:t>
+            </a:r>
+          </a:p>
+          <a:p>
+            <a:r>
+              <a:rPr lang="en-US" dirty="0"/>
+              <a:t>To account for this change, we introduce a new parameter – ‘frac’, which determines the fraction of each slot spent in collision detection.</a:t>
+            </a:r>
+          </a:p>
+        </p:txBody>
+      </p:sp>
+    </p:spTree>
+    <p:extLst>
+      <p:ext uri="{BB962C8B-B14F-4D97-AF65-F5344CB8AC3E}">
+        <p14:creationId xmlns:p14="http://schemas.microsoft.com/office/powerpoint/2010/main" val="1935555215"/>
+      </p:ext>
+    </p:extLst>
+  </p:cSld>
+  <p:clrMapOvr>
+    <a:masterClrMapping/>
+  </p:clrMapOvr>
+</p:sld>
+</file>
+
+<file path=ppt/slides/slide17.xml><?xml version="1.0" encoding="utf-8"?>
+<p:sld xmlns:a="http://schemas.openxmlformats.org/drawingml/2006/main" xmlns:r="http://schemas.openxmlformats.org/officeDocument/2006/relationships" xmlns:p="http://schemas.openxmlformats.org/presentationml/2006/main">
+  <p:cSld>
+    <p:spTree>
+      <p:nvGrpSpPr>
+        <p:cNvPr id="1" name=""/>
+        <p:cNvGrpSpPr/>
+        <p:nvPr/>
+      </p:nvGrpSpPr>
+      <p:grpSpPr>
+        <a:xfrm>
+          <a:off x="0" y="0"/>
+          <a:ext cx="0" cy="0"/>
+          <a:chOff x="0" y="0"/>
+          <a:chExt cx="0" cy="0"/>
+        </a:xfrm>
+      </p:grpSpPr>
+      <p:sp>
+        <p:nvSpPr>
+          <p:cNvPr id="2" name="Title 1">
+            <a:extLst>
+              <a:ext uri="{FF2B5EF4-FFF2-40B4-BE49-F238E27FC236}">
+                <a16:creationId xmlns:a16="http://schemas.microsoft.com/office/drawing/2014/main" id="{36EC83A1-C5A4-594A-A271-CABFFFF9BAC9}"/>
+              </a:ext>
+            </a:extLst>
+          </p:cNvPr>
+          <p:cNvSpPr>
+            <a:spLocks noGrp="1"/>
+          </p:cNvSpPr>
+          <p:nvPr>
+            <p:ph type="title"/>
+          </p:nvPr>
+        </p:nvSpPr>
+        <p:spPr/>
+        <p:txBody>
+          <a:bodyPr/>
+          <a:lstStyle/>
+          <a:p>
+            <a:r>
+              <a:rPr lang="en-US" dirty="0"/>
+              <a:t>Relationship between Frac and Interference – Case 1</a:t>
+            </a:r>
+          </a:p>
+        </p:txBody>
+      </p:sp>
+      <p:sp>
+        <p:nvSpPr>
+          <p:cNvPr id="4" name="Google Shape;173;p26">
+            <a:extLst>
+              <a:ext uri="{FF2B5EF4-FFF2-40B4-BE49-F238E27FC236}">
+                <a16:creationId xmlns:a16="http://schemas.microsoft.com/office/drawing/2014/main" id="{4FA23150-3E81-6447-A3B8-913723C8AB09}"/>
+              </a:ext>
+            </a:extLst>
+          </p:cNvPr>
+          <p:cNvSpPr txBox="1">
+            <a:spLocks noGrp="1"/>
+          </p:cNvSpPr>
+          <p:nvPr>
+            <p:ph type="body" idx="1"/>
+          </p:nvPr>
+        </p:nvSpPr>
+        <p:spPr>
+          <a:xfrm>
+            <a:off x="628649" y="1230596"/>
+            <a:ext cx="8091401" cy="5078763"/>
+          </a:xfrm>
+          <a:prstGeom prst="rect">
+            <a:avLst/>
+          </a:prstGeom>
+        </p:spPr>
+        <p:txBody>
+          <a:bodyPr spcFirstLastPara="1" wrap="square" lIns="91425" tIns="91425" rIns="91425" bIns="91425" anchor="t" anchorCtr="0">
+            <a:noAutofit/>
+          </a:bodyPr>
+          <a:lstStyle/>
+          <a:p>
+            <a:pPr marL="0" lvl="0" indent="0">
+              <a:buNone/>
+            </a:pPr>
+            <a:r>
+              <a:rPr lang="en-US" sz="1800" dirty="0"/>
+              <a:t>1  If offset &gt; 0 (left case):</a:t>
+            </a:r>
+          </a:p>
+          <a:p>
+            <a:pPr marL="0" lvl="0" indent="0">
+              <a:buNone/>
+            </a:pPr>
+            <a:r>
+              <a:rPr lang="en-US" sz="1800" dirty="0"/>
+              <a:t>2	slot[N] = ! </a:t>
+            </a:r>
+            <a:r>
+              <a:rPr lang="en-US" sz="1800" dirty="0" err="1"/>
+              <a:t>intSlot</a:t>
+            </a:r>
+            <a:r>
+              <a:rPr lang="en-US" sz="1800" dirty="0"/>
+              <a:t>[N-1]</a:t>
+            </a:r>
+          </a:p>
+          <a:p>
+            <a:pPr marL="0" lvl="0" indent="0">
+              <a:buNone/>
+            </a:pPr>
+            <a:r>
+              <a:rPr lang="en-US" sz="1800" dirty="0"/>
+              <a:t>3	if offset &lt; frac:</a:t>
+            </a:r>
+            <a:endParaRPr sz="1800" dirty="0"/>
+          </a:p>
+          <a:p>
+            <a:pPr marL="0" lvl="0" indent="0">
+              <a:buNone/>
+            </a:pPr>
+            <a:r>
+              <a:rPr lang="en-US" sz="1800" dirty="0"/>
+              <a:t>4		slot[N] = ! </a:t>
+            </a:r>
+            <a:r>
+              <a:rPr lang="en-US" sz="1800" dirty="0" err="1"/>
+              <a:t>intSlot</a:t>
+            </a:r>
+            <a:r>
+              <a:rPr lang="en-US" sz="1800" dirty="0"/>
+              <a:t>[N]</a:t>
+            </a:r>
+            <a:endParaRPr sz="1800" dirty="0"/>
+          </a:p>
+          <a:p>
+            <a:pPr marL="0" lvl="0" indent="0">
+              <a:buNone/>
+            </a:pPr>
+            <a:r>
+              <a:rPr lang="en-US" sz="1800" dirty="0"/>
+              <a:t>5	</a:t>
+            </a:r>
+            <a:r>
+              <a:rPr lang="en-US" dirty="0"/>
+              <a:t>else:</a:t>
+            </a:r>
+            <a:endParaRPr sz="1800" dirty="0"/>
+          </a:p>
+          <a:p>
+            <a:pPr marL="0" lvl="0" indent="0">
+              <a:buNone/>
+            </a:pPr>
+            <a:r>
+              <a:rPr lang="en-US" sz="1800" dirty="0"/>
+              <a:t>6		</a:t>
+            </a:r>
+            <a:r>
+              <a:rPr lang="en-US" sz="1800" dirty="0" err="1"/>
+              <a:t>intAmt</a:t>
+            </a:r>
+            <a:r>
+              <a:rPr lang="en-US" sz="1800" dirty="0"/>
+              <a:t>[N] = (1 - offset)</a:t>
+            </a:r>
+            <a:endParaRPr sz="1800" dirty="0"/>
+          </a:p>
+        </p:txBody>
+      </p:sp>
+      <p:pic>
+        <p:nvPicPr>
+          <p:cNvPr id="3074" name="Picture 2">
+            <a:extLst>
+              <a:ext uri="{FF2B5EF4-FFF2-40B4-BE49-F238E27FC236}">
+                <a16:creationId xmlns:a16="http://schemas.microsoft.com/office/drawing/2014/main" id="{1299A43A-204B-D04E-9670-9FF84CB75E2B}"/>
+              </a:ext>
+            </a:extLst>
+          </p:cNvPr>
+          <p:cNvPicPr>
+            <a:picLocks noChangeAspect="1" noChangeArrowheads="1"/>
+          </p:cNvPicPr>
+          <p:nvPr/>
+        </p:nvPicPr>
+        <p:blipFill>
+          <a:blip r:embed="rId2">
+            <a:extLst>
+              <a:ext uri="{28A0092B-C50C-407E-A947-70E740481C1C}">
+                <a14:useLocalDpi xmlns:a14="http://schemas.microsoft.com/office/drawing/2010/main" val="0"/>
+              </a:ext>
+            </a:extLst>
+          </a:blip>
+          <a:srcRect/>
+          <a:stretch>
+            <a:fillRect/>
+          </a:stretch>
+        </p:blipFill>
+        <p:spPr bwMode="auto">
+          <a:xfrm>
+            <a:off x="1084696" y="3588789"/>
+            <a:ext cx="6642100" cy="2540000"/>
+          </a:xfrm>
+          <a:prstGeom prst="rect">
+            <a:avLst/>
+          </a:prstGeom>
+          <a:noFill/>
+          <a:extLst>
+            <a:ext uri="{909E8E84-426E-40DD-AFC4-6F175D3DCCD1}">
+              <a14:hiddenFill xmlns:a14="http://schemas.microsoft.com/office/drawing/2010/main">
+                <a:solidFill>
+                  <a:srgbClr val="FFFFFF"/>
+                </a:solidFill>
+              </a14:hiddenFill>
+            </a:ext>
+          </a:extLst>
+        </p:spPr>
+      </p:pic>
+      <p:sp>
+        <p:nvSpPr>
+          <p:cNvPr id="6" name="TextBox 5">
+            <a:extLst>
+              <a:ext uri="{FF2B5EF4-FFF2-40B4-BE49-F238E27FC236}">
+                <a16:creationId xmlns:a16="http://schemas.microsoft.com/office/drawing/2014/main" id="{728A14F1-7B8E-3043-A67B-CA80D7C61722}"/>
+              </a:ext>
+            </a:extLst>
+          </p:cNvPr>
+          <p:cNvSpPr txBox="1"/>
+          <p:nvPr/>
+        </p:nvSpPr>
+        <p:spPr>
+          <a:xfrm>
+            <a:off x="839247" y="6128789"/>
+            <a:ext cx="7465505" cy="307777"/>
+          </a:xfrm>
+          <a:prstGeom prst="rect">
+            <a:avLst/>
+          </a:prstGeom>
+          <a:noFill/>
+        </p:spPr>
+        <p:txBody>
+          <a:bodyPr wrap="none" rtlCol="0">
+            <a:spAutoFit/>
+          </a:bodyPr>
+          <a:lstStyle/>
+          <a:p>
+            <a:r>
+              <a:rPr lang="en-US" dirty="0"/>
+              <a:t>slot[.] is an array with values 0/1 depicting whether nth slot of primary camera is ON or OFF.</a:t>
+            </a:r>
+          </a:p>
+        </p:txBody>
+      </p:sp>
+      <p:sp>
+        <p:nvSpPr>
+          <p:cNvPr id="7" name="TextBox 6">
+            <a:extLst>
+              <a:ext uri="{FF2B5EF4-FFF2-40B4-BE49-F238E27FC236}">
+                <a16:creationId xmlns:a16="http://schemas.microsoft.com/office/drawing/2014/main" id="{BE468905-1B31-8449-974A-2B8E5AE230AD}"/>
+              </a:ext>
+            </a:extLst>
+          </p:cNvPr>
+          <p:cNvSpPr txBox="1"/>
+          <p:nvPr/>
+        </p:nvSpPr>
+        <p:spPr>
+          <a:xfrm>
+            <a:off x="839247" y="6436566"/>
+            <a:ext cx="6567824" cy="307777"/>
+          </a:xfrm>
+          <a:prstGeom prst="rect">
+            <a:avLst/>
+          </a:prstGeom>
+          <a:noFill/>
+        </p:spPr>
+        <p:txBody>
+          <a:bodyPr wrap="none" rtlCol="0">
+            <a:spAutoFit/>
+          </a:bodyPr>
+          <a:lstStyle/>
+          <a:p>
+            <a:r>
+              <a:rPr lang="en-US" dirty="0" err="1"/>
+              <a:t>intAmt</a:t>
+            </a:r>
+            <a:r>
+              <a:rPr lang="en-US" dirty="0"/>
+              <a:t>[.] holds the total observed interference for nth slot for the primary camera.</a:t>
+            </a:r>
+          </a:p>
+        </p:txBody>
+      </p:sp>
+    </p:spTree>
+    <p:extLst>
+      <p:ext uri="{BB962C8B-B14F-4D97-AF65-F5344CB8AC3E}">
+        <p14:creationId xmlns:p14="http://schemas.microsoft.com/office/powerpoint/2010/main" val="2180232740"/>
+      </p:ext>
+    </p:extLst>
+  </p:cSld>
+  <p:clrMapOvr>
+    <a:masterClrMapping/>
+  </p:clrMapOvr>
+</p:sld>
+</file>
+
+<file path=ppt/slides/slide18.xml><?xml version="1.0" encoding="utf-8"?>
+<p:sld xmlns:a="http://schemas.openxmlformats.org/drawingml/2006/main" xmlns:r="http://schemas.openxmlformats.org/officeDocument/2006/relationships" xmlns:p="http://schemas.openxmlformats.org/presentationml/2006/main">
+  <p:cSld>
+    <p:spTree>
+      <p:nvGrpSpPr>
+        <p:cNvPr id="1" name=""/>
+        <p:cNvGrpSpPr/>
+        <p:nvPr/>
+      </p:nvGrpSpPr>
+      <p:grpSpPr>
+        <a:xfrm>
+          <a:off x="0" y="0"/>
+          <a:ext cx="0" cy="0"/>
+          <a:chOff x="0" y="0"/>
+          <a:chExt cx="0" cy="0"/>
+        </a:xfrm>
+      </p:grpSpPr>
+      <p:sp>
+        <p:nvSpPr>
+          <p:cNvPr id="2" name="Title 1">
+            <a:extLst>
+              <a:ext uri="{FF2B5EF4-FFF2-40B4-BE49-F238E27FC236}">
+                <a16:creationId xmlns:a16="http://schemas.microsoft.com/office/drawing/2014/main" id="{36EC83A1-C5A4-594A-A271-CABFFFF9BAC9}"/>
+              </a:ext>
+            </a:extLst>
+          </p:cNvPr>
+          <p:cNvSpPr>
+            <a:spLocks noGrp="1"/>
+          </p:cNvSpPr>
+          <p:nvPr>
+            <p:ph type="title"/>
+          </p:nvPr>
+        </p:nvSpPr>
+        <p:spPr/>
+        <p:txBody>
+          <a:bodyPr/>
+          <a:lstStyle/>
+          <a:p>
+            <a:r>
+              <a:rPr lang="en-US" dirty="0"/>
+              <a:t>Relationship between Frac and Interference – Case 2</a:t>
+            </a:r>
+          </a:p>
+        </p:txBody>
+      </p:sp>
+      <p:sp>
+        <p:nvSpPr>
+          <p:cNvPr id="4" name="Google Shape;173;p26">
+            <a:extLst>
+              <a:ext uri="{FF2B5EF4-FFF2-40B4-BE49-F238E27FC236}">
+                <a16:creationId xmlns:a16="http://schemas.microsoft.com/office/drawing/2014/main" id="{4FA23150-3E81-6447-A3B8-913723C8AB09}"/>
+              </a:ext>
+            </a:extLst>
+          </p:cNvPr>
+          <p:cNvSpPr txBox="1">
+            <a:spLocks noGrp="1"/>
+          </p:cNvSpPr>
+          <p:nvPr>
+            <p:ph type="body" idx="1"/>
+          </p:nvPr>
+        </p:nvSpPr>
+        <p:spPr>
+          <a:xfrm>
+            <a:off x="628649" y="1230596"/>
+            <a:ext cx="8091401" cy="5078763"/>
+          </a:xfrm>
+          <a:prstGeom prst="rect">
+            <a:avLst/>
+          </a:prstGeom>
+        </p:spPr>
+        <p:txBody>
+          <a:bodyPr spcFirstLastPara="1" wrap="square" lIns="91425" tIns="91425" rIns="91425" bIns="91425" anchor="t" anchorCtr="0">
+            <a:noAutofit/>
+          </a:bodyPr>
+          <a:lstStyle/>
+          <a:p>
+            <a:pPr marL="0" lvl="0" indent="0">
+              <a:buNone/>
+            </a:pPr>
+            <a:r>
+              <a:rPr lang="en-US" sz="1800" dirty="0"/>
+              <a:t>1  If offset &lt; 0 (right case):</a:t>
+            </a:r>
+          </a:p>
+          <a:p>
+            <a:pPr marL="0" lvl="0" indent="0">
+              <a:buNone/>
+            </a:pPr>
+            <a:r>
+              <a:rPr lang="en-US" sz="1800" dirty="0"/>
+              <a:t>2	slot[N] = ! </a:t>
+            </a:r>
+            <a:r>
+              <a:rPr lang="en-US" sz="1800" dirty="0" err="1"/>
+              <a:t>intSlot</a:t>
+            </a:r>
+            <a:r>
+              <a:rPr lang="en-US" sz="1800" dirty="0"/>
+              <a:t>[N]</a:t>
+            </a:r>
+          </a:p>
+          <a:p>
+            <a:pPr marL="0" lvl="0" indent="0">
+              <a:buNone/>
+            </a:pPr>
+            <a:r>
+              <a:rPr lang="en-US" sz="1800" dirty="0"/>
+              <a:t>3	if offset &lt; 1 - frac:</a:t>
+            </a:r>
+            <a:endParaRPr sz="1800" dirty="0"/>
+          </a:p>
+          <a:p>
+            <a:pPr marL="0" lvl="0" indent="0">
+              <a:buNone/>
+            </a:pPr>
+            <a:r>
+              <a:rPr lang="en-US" sz="1800" dirty="0"/>
+              <a:t>4		slot[N] = ! </a:t>
+            </a:r>
+            <a:r>
+              <a:rPr lang="en-US" sz="1800" dirty="0" err="1"/>
+              <a:t>intSlot</a:t>
+            </a:r>
+            <a:r>
+              <a:rPr lang="en-US" sz="1800" dirty="0"/>
+              <a:t>[N+1]</a:t>
+            </a:r>
+            <a:endParaRPr sz="1800" dirty="0"/>
+          </a:p>
+          <a:p>
+            <a:pPr marL="0" lvl="0" indent="0">
+              <a:buNone/>
+            </a:pPr>
+            <a:r>
+              <a:rPr lang="en-US" sz="1800" dirty="0"/>
+              <a:t>5	</a:t>
+            </a:r>
+            <a:r>
+              <a:rPr lang="en-US" dirty="0"/>
+              <a:t>else:</a:t>
+            </a:r>
+            <a:endParaRPr sz="1800" dirty="0"/>
+          </a:p>
+          <a:p>
+            <a:pPr marL="0" lvl="0" indent="0">
+              <a:buNone/>
+            </a:pPr>
+            <a:r>
+              <a:rPr lang="en-US" sz="1800" dirty="0"/>
+              <a:t>6		</a:t>
+            </a:r>
+            <a:r>
+              <a:rPr lang="en-US" sz="1800" dirty="0" err="1"/>
+              <a:t>intAmt</a:t>
+            </a:r>
+            <a:r>
+              <a:rPr lang="en-US" sz="1800" dirty="0"/>
+              <a:t>[N] = abs(offset)</a:t>
+            </a:r>
+            <a:endParaRPr sz="1800" dirty="0"/>
+          </a:p>
+        </p:txBody>
+      </p:sp>
+      <p:sp>
+        <p:nvSpPr>
+          <p:cNvPr id="6" name="TextBox 5">
+            <a:extLst>
+              <a:ext uri="{FF2B5EF4-FFF2-40B4-BE49-F238E27FC236}">
+                <a16:creationId xmlns:a16="http://schemas.microsoft.com/office/drawing/2014/main" id="{728A14F1-7B8E-3043-A67B-CA80D7C61722}"/>
+              </a:ext>
+            </a:extLst>
+          </p:cNvPr>
+          <p:cNvSpPr txBox="1"/>
+          <p:nvPr/>
+        </p:nvSpPr>
+        <p:spPr>
+          <a:xfrm>
+            <a:off x="839247" y="6128789"/>
+            <a:ext cx="7465505" cy="307777"/>
+          </a:xfrm>
+          <a:prstGeom prst="rect">
+            <a:avLst/>
+          </a:prstGeom>
+          <a:noFill/>
+        </p:spPr>
+        <p:txBody>
+          <a:bodyPr wrap="none" rtlCol="0">
+            <a:spAutoFit/>
+          </a:bodyPr>
+          <a:lstStyle/>
+          <a:p>
+            <a:r>
+              <a:rPr lang="en-US" dirty="0"/>
+              <a:t>slot[.] is an array with values 0/1 depicting whether nth slot of primary camera is ON or OFF.</a:t>
+            </a:r>
+          </a:p>
+        </p:txBody>
+      </p:sp>
+      <p:sp>
+        <p:nvSpPr>
+          <p:cNvPr id="7" name="TextBox 6">
+            <a:extLst>
+              <a:ext uri="{FF2B5EF4-FFF2-40B4-BE49-F238E27FC236}">
+                <a16:creationId xmlns:a16="http://schemas.microsoft.com/office/drawing/2014/main" id="{BE468905-1B31-8449-974A-2B8E5AE230AD}"/>
+              </a:ext>
+            </a:extLst>
+          </p:cNvPr>
+          <p:cNvSpPr txBox="1"/>
+          <p:nvPr/>
+        </p:nvSpPr>
+        <p:spPr>
+          <a:xfrm>
+            <a:off x="839247" y="6436566"/>
+            <a:ext cx="6567824" cy="307777"/>
+          </a:xfrm>
+          <a:prstGeom prst="rect">
+            <a:avLst/>
+          </a:prstGeom>
+          <a:noFill/>
+        </p:spPr>
+        <p:txBody>
+          <a:bodyPr wrap="none" rtlCol="0">
+            <a:spAutoFit/>
+          </a:bodyPr>
+          <a:lstStyle/>
+          <a:p>
+            <a:r>
+              <a:rPr lang="en-US" dirty="0" err="1"/>
+              <a:t>intAmt</a:t>
+            </a:r>
+            <a:r>
+              <a:rPr lang="en-US" dirty="0"/>
+              <a:t>[.] holds the total observed interference for nth slot for the primary camera.</a:t>
+            </a:r>
+          </a:p>
+        </p:txBody>
+      </p:sp>
+      <p:pic>
+        <p:nvPicPr>
+          <p:cNvPr id="5124" name="Picture 4">
+            <a:extLst>
+              <a:ext uri="{FF2B5EF4-FFF2-40B4-BE49-F238E27FC236}">
+                <a16:creationId xmlns:a16="http://schemas.microsoft.com/office/drawing/2014/main" id="{88F5EC68-973F-4240-A07A-95A77897ABA4}"/>
+              </a:ext>
+            </a:extLst>
+          </p:cNvPr>
+          <p:cNvPicPr>
+            <a:picLocks noChangeAspect="1" noChangeArrowheads="1"/>
+          </p:cNvPicPr>
+          <p:nvPr/>
+        </p:nvPicPr>
+        <p:blipFill>
+          <a:blip r:embed="rId2">
+            <a:extLst>
+              <a:ext uri="{28A0092B-C50C-407E-A947-70E740481C1C}">
+                <a14:useLocalDpi xmlns:a14="http://schemas.microsoft.com/office/drawing/2010/main" val="0"/>
+              </a:ext>
+            </a:extLst>
+          </a:blip>
+          <a:srcRect/>
+          <a:stretch>
+            <a:fillRect/>
+          </a:stretch>
+        </p:blipFill>
+        <p:spPr bwMode="auto">
+          <a:xfrm>
+            <a:off x="1171371" y="3588789"/>
+            <a:ext cx="6235700" cy="2540000"/>
+          </a:xfrm>
+          <a:prstGeom prst="rect">
+            <a:avLst/>
+          </a:prstGeom>
+          <a:noFill/>
+          <a:extLst>
+            <a:ext uri="{909E8E84-426E-40DD-AFC4-6F175D3DCCD1}">
+              <a14:hiddenFill xmlns:a14="http://schemas.microsoft.com/office/drawing/2010/main">
+                <a:solidFill>
+                  <a:srgbClr val="FFFFFF"/>
+                </a:solidFill>
+              </a14:hiddenFill>
+            </a:ext>
+          </a:extLst>
+        </p:spPr>
+      </p:pic>
+    </p:spTree>
+    <p:extLst>
+      <p:ext uri="{BB962C8B-B14F-4D97-AF65-F5344CB8AC3E}">
+        <p14:creationId xmlns:p14="http://schemas.microsoft.com/office/powerpoint/2010/main" val="621877950"/>
+      </p:ext>
+    </p:extLst>
+  </p:cSld>
+  <p:clrMapOvr>
+    <a:masterClrMapping/>
+  </p:clrMapOvr>
+</p:sld>
+</file>
+
+<file path=ppt/slides/slide19.xml><?xml version="1.0" encoding="utf-8"?>
+<p:sld xmlns:a="http://schemas.openxmlformats.org/drawingml/2006/main" xmlns:r="http://schemas.openxmlformats.org/officeDocument/2006/relationships" xmlns:p="http://schemas.openxmlformats.org/presentationml/2006/main">
+  <p:cSld>
+    <p:spTree>
+      <p:nvGrpSpPr>
+        <p:cNvPr id="1" name="Shape 183"/>
+        <p:cNvGrpSpPr/>
+        <p:nvPr/>
+      </p:nvGrpSpPr>
+      <p:grpSpPr>
+        <a:xfrm>
+          <a:off x="0" y="0"/>
+          <a:ext cx="0" cy="0"/>
+          <a:chOff x="0" y="0"/>
+          <a:chExt cx="0" cy="0"/>
+        </a:xfrm>
+      </p:grpSpPr>
+      <p:sp>
+        <p:nvSpPr>
+          <p:cNvPr id="184" name="Google Shape;184;p28"/>
           <p:cNvSpPr txBox="1">
             <a:spLocks noGrp="1"/>
           </p:cNvSpPr>
@@ -15397,7 +16891,7 @@
             </a:pPr>
             <a:r>
               <a:rPr lang="en-US"/>
-              <a:t>Next Steps</a:t>
+              <a:t>Results: Simulation</a:t>
             </a:r>
             <a:endParaRPr/>
           </a:p>
@@ -15405,7 +16899,7 @@
       </p:sp>
       <p:sp>
         <p:nvSpPr>
-          <p:cNvPr id="219" name="Google Shape;219;p32"/>
+          <p:cNvPr id="185" name="Google Shape;185;p28"/>
           <p:cNvSpPr txBox="1">
             <a:spLocks noGrp="1"/>
           </p:cNvSpPr>
@@ -15415,7 +16909,7 @@
         </p:nvSpPr>
         <p:spPr>
           <a:xfrm>
-            <a:off x="628650" y="1230597"/>
+            <a:off x="628650" y="1102346"/>
             <a:ext cx="7886700" cy="5049000"/>
           </a:xfrm>
           <a:prstGeom prst="rect">
@@ -15428,73 +16922,277 @@
           </a:bodyPr>
           <a:lstStyle/>
           <a:p>
-            <a:pPr marL="457200" lvl="0" indent="-361950" algn="l" rtl="0">
+            <a:pPr marL="457200" lvl="0" indent="-336550" algn="l" rtl="0">
               <a:spcBef>
                 <a:spcPts val="750"/>
               </a:spcBef>
               <a:spcAft>
                 <a:spcPts val="0"/>
               </a:spcAft>
-              <a:buSzPts val="2100"/>
+              <a:buSzPts val="1700"/>
               <a:buChar char="•"/>
             </a:pPr>
             <a:r>
-              <a:rPr lang="en-US" dirty="0"/>
-              <a:t>Evaluate under more circumstances of power amplifications and ON probabilities of interfering cameras.</a:t>
-            </a:r>
-          </a:p>
-          <a:p>
-            <a:r>
-              <a:rPr lang="en-US" dirty="0"/>
-              <a:t>Simulate a real world setting where each interfering camera can follow a different protocol.</a:t>
-            </a:r>
-            <a:endParaRPr dirty="0"/>
-          </a:p>
-          <a:p>
-            <a:pPr marL="457200" lvl="0" indent="-361950" algn="l" rtl="0">
-              <a:spcBef>
-                <a:spcPts val="1000"/>
-              </a:spcBef>
-              <a:spcAft>
-                <a:spcPts val="0"/>
-              </a:spcAft>
-              <a:buSzPts val="2100"/>
+              <a:rPr lang="en-US" sz="1700" dirty="0"/>
+              <a:t>Comparison Baselines:</a:t>
+            </a:r>
+            <a:endParaRPr sz="1700" dirty="0"/>
+          </a:p>
+          <a:p>
+            <a:pPr marL="914400" lvl="1" indent="-317500" algn="l" rtl="0">
+              <a:spcBef>
+                <a:spcPts val="0"/>
+              </a:spcBef>
+              <a:spcAft>
+                <a:spcPts val="0"/>
+              </a:spcAft>
+              <a:buSzPts val="1400"/>
               <a:buChar char="•"/>
             </a:pPr>
             <a:r>
-              <a:rPr lang="en-US" dirty="0"/>
-              <a:t>Theoretical bounds for the peak power amplification for the carrier sensing protocol.</a:t>
-            </a:r>
-            <a:endParaRPr dirty="0"/>
-          </a:p>
-          <a:p>
-            <a:pPr marL="457200" lvl="0" indent="-361950" algn="l" rtl="0">
-              <a:spcBef>
-                <a:spcPts val="1000"/>
-              </a:spcBef>
-              <a:spcAft>
-                <a:spcPts val="1000"/>
-              </a:spcAft>
-              <a:buSzPts val="2100"/>
+              <a:rPr lang="en-US" sz="1400" dirty="0"/>
+              <a:t>PN (</a:t>
+            </a:r>
+            <a:r>
+              <a:rPr lang="en-US" sz="1400" dirty="0" err="1"/>
+              <a:t>Pseudonoise</a:t>
+            </a:r>
+            <a:r>
+              <a:rPr lang="en-US" sz="1400" dirty="0"/>
+              <a:t>): Uses non-sinusoid modulation and demodulation functions. </a:t>
+            </a:r>
+            <a:endParaRPr sz="1400" dirty="0"/>
+          </a:p>
+          <a:p>
+            <a:pPr marL="914400" lvl="1" indent="-317500" algn="l" rtl="0">
+              <a:spcBef>
+                <a:spcPts val="0"/>
+              </a:spcBef>
+              <a:spcAft>
+                <a:spcPts val="0"/>
+              </a:spcAft>
+              <a:buSzPts val="1400"/>
               <a:buChar char="•"/>
             </a:pPr>
             <a:r>
-              <a:rPr lang="en-US" dirty="0"/>
-              <a:t>Verify feasibility of slot durations in real </a:t>
-            </a:r>
-            <a:r>
-              <a:rPr lang="en-US" dirty="0" err="1"/>
-              <a:t>ToF</a:t>
-            </a:r>
-            <a:r>
-              <a:rPr lang="en-US" dirty="0"/>
-              <a:t> cameras.</a:t>
-            </a:r>
-            <a:endParaRPr dirty="0"/>
+              <a:rPr lang="en-US" sz="1400" dirty="0"/>
+              <a:t>ACO (AC Orthogonal): Using orthogonal frequencies for the interfering cameras. </a:t>
+            </a:r>
+            <a:endParaRPr sz="1400" dirty="0"/>
+          </a:p>
+          <a:p>
+            <a:pPr marL="914400" lvl="1" indent="-317500" algn="l" rtl="0">
+              <a:spcBef>
+                <a:spcPts val="0"/>
+              </a:spcBef>
+              <a:spcAft>
+                <a:spcPts val="0"/>
+              </a:spcAft>
+              <a:buSzPts val="1400"/>
+              <a:buChar char="•"/>
+            </a:pPr>
+            <a:r>
+              <a:rPr lang="en-US" sz="1400" dirty="0"/>
+              <a:t>SEC (Stochastic Exposure Coding): Makes use of a stochastic TDMA protocol</a:t>
+            </a:r>
+            <a:endParaRPr sz="1400" dirty="0"/>
+          </a:p>
+          <a:p>
+            <a:pPr marL="914400" lvl="1" indent="-317500" algn="l" rtl="0">
+              <a:spcBef>
+                <a:spcPts val="0"/>
+              </a:spcBef>
+              <a:spcAft>
+                <a:spcPts val="0"/>
+              </a:spcAft>
+              <a:buSzPts val="1400"/>
+              <a:buChar char="•"/>
+            </a:pPr>
+            <a:r>
+              <a:rPr lang="en-US" sz="1400" dirty="0"/>
+              <a:t>CMB: Combined ACO and SEC</a:t>
+            </a:r>
+            <a:endParaRPr sz="1400" dirty="0"/>
+          </a:p>
+          <a:p>
+            <a:pPr marL="914400" lvl="1" indent="-317500" algn="l" rtl="0">
+              <a:spcBef>
+                <a:spcPts val="0"/>
+              </a:spcBef>
+              <a:spcAft>
+                <a:spcPts val="0"/>
+              </a:spcAft>
+              <a:buSzPts val="1400"/>
+              <a:buChar char="•"/>
+            </a:pPr>
+            <a:r>
+              <a:rPr lang="en-US" sz="1400" dirty="0"/>
+              <a:t>CSMA: Intervention to use a-priori carrier sensing</a:t>
+            </a:r>
+            <a:endParaRPr sz="1400" dirty="0"/>
+          </a:p>
+          <a:p>
+            <a:pPr lvl="0" indent="-317500">
+              <a:spcBef>
+                <a:spcPts val="0"/>
+              </a:spcBef>
+              <a:buSzPts val="1400"/>
+            </a:pPr>
+            <a:r>
+              <a:rPr lang="en-US" sz="1400" dirty="0"/>
+              <a:t>Following results are for CSMA approach using the </a:t>
+            </a:r>
+            <a:r>
+              <a:rPr lang="en-US" sz="1400" b="1" dirty="0"/>
+              <a:t>frac = 0.1</a:t>
+            </a:r>
+            <a:r>
+              <a:rPr lang="en-US" sz="1400" dirty="0"/>
+              <a:t>, </a:t>
+            </a:r>
+            <a:r>
+              <a:rPr lang="en-US" sz="1400" b="1" dirty="0"/>
+              <a:t>half Power Amplification as SEC, </a:t>
+            </a:r>
+            <a:r>
+              <a:rPr lang="en-US" sz="1400" b="1" dirty="0">
+                <a:solidFill>
+                  <a:srgbClr val="000000"/>
+                </a:solidFill>
+              </a:rPr>
+              <a:t>10% increase in probability </a:t>
+            </a:r>
+            <a:r>
+              <a:rPr lang="en-US" sz="1400" b="1" dirty="0" err="1">
+                <a:solidFill>
+                  <a:srgbClr val="000000"/>
+                </a:solidFill>
+              </a:rPr>
+              <a:t>p_CMB</a:t>
+            </a:r>
+            <a:endParaRPr sz="1400" b="1" dirty="0"/>
           </a:p>
         </p:txBody>
       </p:sp>
+      <p:sp>
+        <p:nvSpPr>
+          <p:cNvPr id="187" name="Google Shape;187;p28"/>
+          <p:cNvSpPr txBox="1"/>
+          <p:nvPr/>
+        </p:nvSpPr>
+        <p:spPr>
+          <a:xfrm rot="-5400000">
+            <a:off x="196925" y="4442850"/>
+            <a:ext cx="2382600" cy="354900"/>
+          </a:xfrm>
+          <a:prstGeom prst="rect">
+            <a:avLst/>
+          </a:prstGeom>
+          <a:noFill/>
+          <a:ln>
+            <a:noFill/>
+          </a:ln>
+        </p:spPr>
+        <p:txBody>
+          <a:bodyPr spcFirstLastPara="1" wrap="square" lIns="91425" tIns="91425" rIns="91425" bIns="91425" anchor="t" anchorCtr="0">
+            <a:noAutofit/>
+          </a:bodyPr>
+          <a:lstStyle/>
+          <a:p>
+            <a:pPr marL="0" lvl="0" indent="0" algn="l" rtl="0">
+              <a:spcBef>
+                <a:spcPts val="0"/>
+              </a:spcBef>
+              <a:spcAft>
+                <a:spcPts val="0"/>
+              </a:spcAft>
+              <a:buNone/>
+            </a:pPr>
+            <a:r>
+              <a:rPr lang="en-US" dirty="0"/>
+              <a:t>Inverse Standard Deviation</a:t>
+            </a:r>
+            <a:endParaRPr dirty="0"/>
+          </a:p>
+        </p:txBody>
+      </p:sp>
+      <p:sp>
+        <p:nvSpPr>
+          <p:cNvPr id="188" name="Google Shape;188;p28"/>
+          <p:cNvSpPr txBox="1"/>
+          <p:nvPr/>
+        </p:nvSpPr>
+        <p:spPr>
+          <a:xfrm>
+            <a:off x="3683550" y="6390175"/>
+            <a:ext cx="1776900" cy="354900"/>
+          </a:xfrm>
+          <a:prstGeom prst="rect">
+            <a:avLst/>
+          </a:prstGeom>
+          <a:noFill/>
+          <a:ln>
+            <a:noFill/>
+          </a:ln>
+        </p:spPr>
+        <p:txBody>
+          <a:bodyPr spcFirstLastPara="1" wrap="square" lIns="91425" tIns="91425" rIns="91425" bIns="91425" anchor="t" anchorCtr="0">
+            <a:noAutofit/>
+          </a:bodyPr>
+          <a:lstStyle/>
+          <a:p>
+            <a:pPr marL="0" lvl="0" indent="0" algn="l" rtl="0">
+              <a:spcBef>
+                <a:spcPts val="0"/>
+              </a:spcBef>
+              <a:spcAft>
+                <a:spcPts val="0"/>
+              </a:spcAft>
+              <a:buNone/>
+            </a:pPr>
+            <a:r>
+              <a:rPr lang="en-US"/>
+              <a:t>Interfering Cameras</a:t>
+            </a:r>
+            <a:endParaRPr/>
+          </a:p>
+        </p:txBody>
+      </p:sp>
+      <p:pic>
+        <p:nvPicPr>
+          <p:cNvPr id="9" name="Picture 8">
+            <a:extLst>
+              <a:ext uri="{FF2B5EF4-FFF2-40B4-BE49-F238E27FC236}">
+                <a16:creationId xmlns:a16="http://schemas.microsoft.com/office/drawing/2014/main" id="{20179DEB-1FCC-7F46-8F74-E0800D9921B1}"/>
+              </a:ext>
+            </a:extLst>
+          </p:cNvPr>
+          <p:cNvPicPr>
+            <a:picLocks noChangeAspect="1"/>
+          </p:cNvPicPr>
+          <p:nvPr/>
+        </p:nvPicPr>
+        <p:blipFill>
+          <a:blip r:embed="rId3"/>
+          <a:srcRect/>
+          <a:stretch/>
+        </p:blipFill>
+        <p:spPr>
+          <a:xfrm>
+            <a:off x="1645920" y="2992582"/>
+            <a:ext cx="6633556" cy="3513664"/>
+          </a:xfrm>
+          <a:prstGeom prst="rect">
+            <a:avLst/>
+          </a:prstGeom>
+        </p:spPr>
+      </p:pic>
     </p:spTree>
+    <p:extLst>
+      <p:ext uri="{BB962C8B-B14F-4D97-AF65-F5344CB8AC3E}">
+        <p14:creationId xmlns:p14="http://schemas.microsoft.com/office/powerpoint/2010/main" val="1644443534"/>
+      </p:ext>
+    </p:extLst>
   </p:cSld>
   <p:clrMapOvr>
     <a:masterClrMapping/>
@@ -15686,6 +17384,2434 @@
         </p:txBody>
       </p:sp>
     </p:spTree>
+  </p:cSld>
+  <p:clrMapOvr>
+    <a:masterClrMapping/>
+  </p:clrMapOvr>
+</p:sld>
+</file>
+
+<file path=ppt/slides/slide20.xml><?xml version="1.0" encoding="utf-8"?>
+<p:sld xmlns:a="http://schemas.openxmlformats.org/drawingml/2006/main" xmlns:r="http://schemas.openxmlformats.org/officeDocument/2006/relationships" xmlns:p="http://schemas.openxmlformats.org/presentationml/2006/main">
+  <p:cSld>
+    <p:spTree>
+      <p:nvGrpSpPr>
+        <p:cNvPr id="1" name="Shape 183"/>
+        <p:cNvGrpSpPr/>
+        <p:nvPr/>
+      </p:nvGrpSpPr>
+      <p:grpSpPr>
+        <a:xfrm>
+          <a:off x="0" y="0"/>
+          <a:ext cx="0" cy="0"/>
+          <a:chOff x="0" y="0"/>
+          <a:chExt cx="0" cy="0"/>
+        </a:xfrm>
+      </p:grpSpPr>
+      <p:sp>
+        <p:nvSpPr>
+          <p:cNvPr id="184" name="Google Shape;184;p28"/>
+          <p:cNvSpPr txBox="1">
+            <a:spLocks noGrp="1"/>
+          </p:cNvSpPr>
+          <p:nvPr>
+            <p:ph type="title"/>
+          </p:nvPr>
+        </p:nvSpPr>
+        <p:spPr>
+          <a:xfrm>
+            <a:off x="628650" y="316372"/>
+            <a:ext cx="7886700" cy="640800"/>
+          </a:xfrm>
+          <a:prstGeom prst="rect">
+            <a:avLst/>
+          </a:prstGeom>
+        </p:spPr>
+        <p:txBody>
+          <a:bodyPr spcFirstLastPara="1" wrap="square" lIns="91425" tIns="91425" rIns="91425" bIns="91425" anchor="ctr" anchorCtr="0">
+            <a:noAutofit/>
+          </a:bodyPr>
+          <a:lstStyle/>
+          <a:p>
+            <a:pPr marL="0" lvl="0" indent="0" algn="l" rtl="0">
+              <a:spcBef>
+                <a:spcPts val="0"/>
+              </a:spcBef>
+              <a:spcAft>
+                <a:spcPts val="0"/>
+              </a:spcAft>
+              <a:buNone/>
+            </a:pPr>
+            <a:r>
+              <a:rPr lang="en-US"/>
+              <a:t>Results: Simulation</a:t>
+            </a:r>
+            <a:endParaRPr/>
+          </a:p>
+        </p:txBody>
+      </p:sp>
+      <p:sp>
+        <p:nvSpPr>
+          <p:cNvPr id="185" name="Google Shape;185;p28"/>
+          <p:cNvSpPr txBox="1">
+            <a:spLocks noGrp="1"/>
+          </p:cNvSpPr>
+          <p:nvPr>
+            <p:ph type="body" idx="1"/>
+          </p:nvPr>
+        </p:nvSpPr>
+        <p:spPr>
+          <a:xfrm>
+            <a:off x="628650" y="1102346"/>
+            <a:ext cx="7886700" cy="5049000"/>
+          </a:xfrm>
+          <a:prstGeom prst="rect">
+            <a:avLst/>
+          </a:prstGeom>
+        </p:spPr>
+        <p:txBody>
+          <a:bodyPr spcFirstLastPara="1" wrap="square" lIns="91425" tIns="91425" rIns="91425" bIns="91425" anchor="t" anchorCtr="0">
+            <a:noAutofit/>
+          </a:bodyPr>
+          <a:lstStyle/>
+          <a:p>
+            <a:pPr marL="457200" lvl="0" indent="-336550" algn="l" rtl="0">
+              <a:spcBef>
+                <a:spcPts val="750"/>
+              </a:spcBef>
+              <a:spcAft>
+                <a:spcPts val="0"/>
+              </a:spcAft>
+              <a:buSzPts val="1700"/>
+              <a:buChar char="•"/>
+            </a:pPr>
+            <a:r>
+              <a:rPr lang="en-US" sz="1700" dirty="0"/>
+              <a:t>Comparison Baselines:</a:t>
+            </a:r>
+            <a:endParaRPr sz="1700" dirty="0"/>
+          </a:p>
+          <a:p>
+            <a:pPr marL="914400" lvl="1" indent="-317500" algn="l" rtl="0">
+              <a:spcBef>
+                <a:spcPts val="0"/>
+              </a:spcBef>
+              <a:spcAft>
+                <a:spcPts val="0"/>
+              </a:spcAft>
+              <a:buSzPts val="1400"/>
+              <a:buChar char="•"/>
+            </a:pPr>
+            <a:r>
+              <a:rPr lang="en-US" sz="1400" dirty="0"/>
+              <a:t>PN (</a:t>
+            </a:r>
+            <a:r>
+              <a:rPr lang="en-US" sz="1400" dirty="0" err="1"/>
+              <a:t>Pseudonoise</a:t>
+            </a:r>
+            <a:r>
+              <a:rPr lang="en-US" sz="1400" dirty="0"/>
+              <a:t>): Uses non-sinusoid modulation and demodulation functions. </a:t>
+            </a:r>
+            <a:endParaRPr sz="1400" dirty="0"/>
+          </a:p>
+          <a:p>
+            <a:pPr marL="914400" lvl="1" indent="-317500" algn="l" rtl="0">
+              <a:spcBef>
+                <a:spcPts val="0"/>
+              </a:spcBef>
+              <a:spcAft>
+                <a:spcPts val="0"/>
+              </a:spcAft>
+              <a:buSzPts val="1400"/>
+              <a:buChar char="•"/>
+            </a:pPr>
+            <a:r>
+              <a:rPr lang="en-US" sz="1400" dirty="0"/>
+              <a:t>ACO (AC Orthogonal): Using orthogonal frequencies for the interfering cameras. </a:t>
+            </a:r>
+            <a:endParaRPr sz="1400" dirty="0"/>
+          </a:p>
+          <a:p>
+            <a:pPr marL="914400" lvl="1" indent="-317500" algn="l" rtl="0">
+              <a:spcBef>
+                <a:spcPts val="0"/>
+              </a:spcBef>
+              <a:spcAft>
+                <a:spcPts val="0"/>
+              </a:spcAft>
+              <a:buSzPts val="1400"/>
+              <a:buChar char="•"/>
+            </a:pPr>
+            <a:r>
+              <a:rPr lang="en-US" sz="1400" dirty="0"/>
+              <a:t>SEC (Stochastic Exposure Coding): Makes use of a stochastic TDMA protocol</a:t>
+            </a:r>
+            <a:endParaRPr sz="1400" dirty="0"/>
+          </a:p>
+          <a:p>
+            <a:pPr marL="914400" lvl="1" indent="-317500" algn="l" rtl="0">
+              <a:spcBef>
+                <a:spcPts val="0"/>
+              </a:spcBef>
+              <a:spcAft>
+                <a:spcPts val="0"/>
+              </a:spcAft>
+              <a:buSzPts val="1400"/>
+              <a:buChar char="•"/>
+            </a:pPr>
+            <a:r>
+              <a:rPr lang="en-US" sz="1400" dirty="0"/>
+              <a:t>CMB: Combined ACO and SEC</a:t>
+            </a:r>
+            <a:endParaRPr sz="1400" dirty="0"/>
+          </a:p>
+          <a:p>
+            <a:pPr marL="914400" lvl="1" indent="-317500" algn="l" rtl="0">
+              <a:spcBef>
+                <a:spcPts val="0"/>
+              </a:spcBef>
+              <a:spcAft>
+                <a:spcPts val="0"/>
+              </a:spcAft>
+              <a:buSzPts val="1400"/>
+              <a:buChar char="•"/>
+            </a:pPr>
+            <a:r>
+              <a:rPr lang="en-US" sz="1400" dirty="0"/>
+              <a:t>CSMA: Intervention to use a-priori carrier sensing</a:t>
+            </a:r>
+            <a:endParaRPr sz="1400" dirty="0"/>
+          </a:p>
+          <a:p>
+            <a:pPr lvl="0" indent="-317500">
+              <a:spcBef>
+                <a:spcPts val="0"/>
+              </a:spcBef>
+              <a:buSzPts val="1400"/>
+            </a:pPr>
+            <a:r>
+              <a:rPr lang="en-US" sz="1400" dirty="0"/>
+              <a:t>Following results are for CSMA approach using the </a:t>
+            </a:r>
+            <a:r>
+              <a:rPr lang="en-US" sz="1400" b="1" dirty="0"/>
+              <a:t>frac = 0.3</a:t>
+            </a:r>
+            <a:r>
+              <a:rPr lang="en-US" sz="1400" dirty="0"/>
+              <a:t>, </a:t>
+            </a:r>
+            <a:r>
+              <a:rPr lang="en-US" sz="1400" b="1" dirty="0"/>
+              <a:t>half Power Amplification as SEC, </a:t>
+            </a:r>
+            <a:r>
+              <a:rPr lang="en-US" sz="1400" b="1" dirty="0">
+                <a:solidFill>
+                  <a:srgbClr val="000000"/>
+                </a:solidFill>
+              </a:rPr>
+              <a:t>10% increase in probability </a:t>
+            </a:r>
+            <a:r>
+              <a:rPr lang="en-US" sz="1400" b="1" dirty="0" err="1">
+                <a:solidFill>
+                  <a:srgbClr val="000000"/>
+                </a:solidFill>
+              </a:rPr>
+              <a:t>p_CMB</a:t>
+            </a:r>
+            <a:endParaRPr sz="1400" b="1" dirty="0"/>
+          </a:p>
+        </p:txBody>
+      </p:sp>
+      <p:sp>
+        <p:nvSpPr>
+          <p:cNvPr id="187" name="Google Shape;187;p28"/>
+          <p:cNvSpPr txBox="1"/>
+          <p:nvPr/>
+        </p:nvSpPr>
+        <p:spPr>
+          <a:xfrm rot="-5400000">
+            <a:off x="196925" y="4442850"/>
+            <a:ext cx="2382600" cy="354900"/>
+          </a:xfrm>
+          <a:prstGeom prst="rect">
+            <a:avLst/>
+          </a:prstGeom>
+          <a:noFill/>
+          <a:ln>
+            <a:noFill/>
+          </a:ln>
+        </p:spPr>
+        <p:txBody>
+          <a:bodyPr spcFirstLastPara="1" wrap="square" lIns="91425" tIns="91425" rIns="91425" bIns="91425" anchor="t" anchorCtr="0">
+            <a:noAutofit/>
+          </a:bodyPr>
+          <a:lstStyle/>
+          <a:p>
+            <a:pPr marL="0" lvl="0" indent="0" algn="l" rtl="0">
+              <a:spcBef>
+                <a:spcPts val="0"/>
+              </a:spcBef>
+              <a:spcAft>
+                <a:spcPts val="0"/>
+              </a:spcAft>
+              <a:buNone/>
+            </a:pPr>
+            <a:r>
+              <a:rPr lang="en-US" dirty="0"/>
+              <a:t>Inverse Standard Deviation</a:t>
+            </a:r>
+            <a:endParaRPr dirty="0"/>
+          </a:p>
+        </p:txBody>
+      </p:sp>
+      <p:sp>
+        <p:nvSpPr>
+          <p:cNvPr id="188" name="Google Shape;188;p28"/>
+          <p:cNvSpPr txBox="1"/>
+          <p:nvPr/>
+        </p:nvSpPr>
+        <p:spPr>
+          <a:xfrm>
+            <a:off x="3683550" y="6390175"/>
+            <a:ext cx="1776900" cy="354900"/>
+          </a:xfrm>
+          <a:prstGeom prst="rect">
+            <a:avLst/>
+          </a:prstGeom>
+          <a:noFill/>
+          <a:ln>
+            <a:noFill/>
+          </a:ln>
+        </p:spPr>
+        <p:txBody>
+          <a:bodyPr spcFirstLastPara="1" wrap="square" lIns="91425" tIns="91425" rIns="91425" bIns="91425" anchor="t" anchorCtr="0">
+            <a:noAutofit/>
+          </a:bodyPr>
+          <a:lstStyle/>
+          <a:p>
+            <a:pPr marL="0" lvl="0" indent="0" algn="l" rtl="0">
+              <a:spcBef>
+                <a:spcPts val="0"/>
+              </a:spcBef>
+              <a:spcAft>
+                <a:spcPts val="0"/>
+              </a:spcAft>
+              <a:buNone/>
+            </a:pPr>
+            <a:r>
+              <a:rPr lang="en-US"/>
+              <a:t>Interfering Cameras</a:t>
+            </a:r>
+            <a:endParaRPr/>
+          </a:p>
+        </p:txBody>
+      </p:sp>
+      <p:pic>
+        <p:nvPicPr>
+          <p:cNvPr id="9" name="Picture 8">
+            <a:extLst>
+              <a:ext uri="{FF2B5EF4-FFF2-40B4-BE49-F238E27FC236}">
+                <a16:creationId xmlns:a16="http://schemas.microsoft.com/office/drawing/2014/main" id="{20179DEB-1FCC-7F46-8F74-E0800D9921B1}"/>
+              </a:ext>
+            </a:extLst>
+          </p:cNvPr>
+          <p:cNvPicPr>
+            <a:picLocks noChangeAspect="1"/>
+          </p:cNvPicPr>
+          <p:nvPr/>
+        </p:nvPicPr>
+        <p:blipFill>
+          <a:blip r:embed="rId3"/>
+          <a:srcRect/>
+          <a:stretch/>
+        </p:blipFill>
+        <p:spPr>
+          <a:xfrm>
+            <a:off x="1645921" y="2992582"/>
+            <a:ext cx="6691744" cy="3513664"/>
+          </a:xfrm>
+          <a:prstGeom prst="rect">
+            <a:avLst/>
+          </a:prstGeom>
+        </p:spPr>
+      </p:pic>
+    </p:spTree>
+    <p:extLst>
+      <p:ext uri="{BB962C8B-B14F-4D97-AF65-F5344CB8AC3E}">
+        <p14:creationId xmlns:p14="http://schemas.microsoft.com/office/powerpoint/2010/main" val="2217777258"/>
+      </p:ext>
+    </p:extLst>
+  </p:cSld>
+  <p:clrMapOvr>
+    <a:masterClrMapping/>
+  </p:clrMapOvr>
+</p:sld>
+</file>
+
+<file path=ppt/slides/slide21.xml><?xml version="1.0" encoding="utf-8"?>
+<p:sld xmlns:a="http://schemas.openxmlformats.org/drawingml/2006/main" xmlns:r="http://schemas.openxmlformats.org/officeDocument/2006/relationships" xmlns:p="http://schemas.openxmlformats.org/presentationml/2006/main">
+  <p:cSld>
+    <p:spTree>
+      <p:nvGrpSpPr>
+        <p:cNvPr id="1" name="Shape 183"/>
+        <p:cNvGrpSpPr/>
+        <p:nvPr/>
+      </p:nvGrpSpPr>
+      <p:grpSpPr>
+        <a:xfrm>
+          <a:off x="0" y="0"/>
+          <a:ext cx="0" cy="0"/>
+          <a:chOff x="0" y="0"/>
+          <a:chExt cx="0" cy="0"/>
+        </a:xfrm>
+      </p:grpSpPr>
+      <p:sp>
+        <p:nvSpPr>
+          <p:cNvPr id="184" name="Google Shape;184;p28"/>
+          <p:cNvSpPr txBox="1">
+            <a:spLocks noGrp="1"/>
+          </p:cNvSpPr>
+          <p:nvPr>
+            <p:ph type="title"/>
+          </p:nvPr>
+        </p:nvSpPr>
+        <p:spPr>
+          <a:xfrm>
+            <a:off x="628650" y="316372"/>
+            <a:ext cx="7886700" cy="640800"/>
+          </a:xfrm>
+          <a:prstGeom prst="rect">
+            <a:avLst/>
+          </a:prstGeom>
+        </p:spPr>
+        <p:txBody>
+          <a:bodyPr spcFirstLastPara="1" wrap="square" lIns="91425" tIns="91425" rIns="91425" bIns="91425" anchor="ctr" anchorCtr="0">
+            <a:noAutofit/>
+          </a:bodyPr>
+          <a:lstStyle/>
+          <a:p>
+            <a:pPr marL="0" lvl="0" indent="0" algn="l" rtl="0">
+              <a:spcBef>
+                <a:spcPts val="0"/>
+              </a:spcBef>
+              <a:spcAft>
+                <a:spcPts val="0"/>
+              </a:spcAft>
+              <a:buNone/>
+            </a:pPr>
+            <a:r>
+              <a:rPr lang="en-US"/>
+              <a:t>Results: Simulation</a:t>
+            </a:r>
+            <a:endParaRPr/>
+          </a:p>
+        </p:txBody>
+      </p:sp>
+      <p:sp>
+        <p:nvSpPr>
+          <p:cNvPr id="185" name="Google Shape;185;p28"/>
+          <p:cNvSpPr txBox="1">
+            <a:spLocks noGrp="1"/>
+          </p:cNvSpPr>
+          <p:nvPr>
+            <p:ph type="body" idx="1"/>
+          </p:nvPr>
+        </p:nvSpPr>
+        <p:spPr>
+          <a:xfrm>
+            <a:off x="628650" y="1102346"/>
+            <a:ext cx="7886700" cy="5049000"/>
+          </a:xfrm>
+          <a:prstGeom prst="rect">
+            <a:avLst/>
+          </a:prstGeom>
+        </p:spPr>
+        <p:txBody>
+          <a:bodyPr spcFirstLastPara="1" wrap="square" lIns="91425" tIns="91425" rIns="91425" bIns="91425" anchor="t" anchorCtr="0">
+            <a:noAutofit/>
+          </a:bodyPr>
+          <a:lstStyle/>
+          <a:p>
+            <a:pPr marL="457200" lvl="0" indent="-336550" algn="l" rtl="0">
+              <a:spcBef>
+                <a:spcPts val="750"/>
+              </a:spcBef>
+              <a:spcAft>
+                <a:spcPts val="0"/>
+              </a:spcAft>
+              <a:buSzPts val="1700"/>
+              <a:buChar char="•"/>
+            </a:pPr>
+            <a:r>
+              <a:rPr lang="en-US" sz="1700" dirty="0"/>
+              <a:t>Comparison Baselines:</a:t>
+            </a:r>
+            <a:endParaRPr sz="1700" dirty="0"/>
+          </a:p>
+          <a:p>
+            <a:pPr marL="914400" lvl="1" indent="-317500" algn="l" rtl="0">
+              <a:spcBef>
+                <a:spcPts val="0"/>
+              </a:spcBef>
+              <a:spcAft>
+                <a:spcPts val="0"/>
+              </a:spcAft>
+              <a:buSzPts val="1400"/>
+              <a:buChar char="•"/>
+            </a:pPr>
+            <a:r>
+              <a:rPr lang="en-US" sz="1400" dirty="0"/>
+              <a:t>PN (</a:t>
+            </a:r>
+            <a:r>
+              <a:rPr lang="en-US" sz="1400" dirty="0" err="1"/>
+              <a:t>Pseudonoise</a:t>
+            </a:r>
+            <a:r>
+              <a:rPr lang="en-US" sz="1400" dirty="0"/>
+              <a:t>): Uses non-sinusoid modulation and demodulation functions. </a:t>
+            </a:r>
+            <a:endParaRPr sz="1400" dirty="0"/>
+          </a:p>
+          <a:p>
+            <a:pPr marL="914400" lvl="1" indent="-317500" algn="l" rtl="0">
+              <a:spcBef>
+                <a:spcPts val="0"/>
+              </a:spcBef>
+              <a:spcAft>
+                <a:spcPts val="0"/>
+              </a:spcAft>
+              <a:buSzPts val="1400"/>
+              <a:buChar char="•"/>
+            </a:pPr>
+            <a:r>
+              <a:rPr lang="en-US" sz="1400" dirty="0"/>
+              <a:t>ACO (AC Orthogonal): Using orthogonal frequencies for the interfering cameras. </a:t>
+            </a:r>
+            <a:endParaRPr sz="1400" dirty="0"/>
+          </a:p>
+          <a:p>
+            <a:pPr marL="914400" lvl="1" indent="-317500" algn="l" rtl="0">
+              <a:spcBef>
+                <a:spcPts val="0"/>
+              </a:spcBef>
+              <a:spcAft>
+                <a:spcPts val="0"/>
+              </a:spcAft>
+              <a:buSzPts val="1400"/>
+              <a:buChar char="•"/>
+            </a:pPr>
+            <a:r>
+              <a:rPr lang="en-US" sz="1400" dirty="0"/>
+              <a:t>SEC (Stochastic Exposure Coding): Makes use of a stochastic TDMA protocol</a:t>
+            </a:r>
+            <a:endParaRPr sz="1400" dirty="0"/>
+          </a:p>
+          <a:p>
+            <a:pPr marL="914400" lvl="1" indent="-317500" algn="l" rtl="0">
+              <a:spcBef>
+                <a:spcPts val="0"/>
+              </a:spcBef>
+              <a:spcAft>
+                <a:spcPts val="0"/>
+              </a:spcAft>
+              <a:buSzPts val="1400"/>
+              <a:buChar char="•"/>
+            </a:pPr>
+            <a:r>
+              <a:rPr lang="en-US" sz="1400" dirty="0"/>
+              <a:t>CMB: Combined ACO and SEC</a:t>
+            </a:r>
+            <a:endParaRPr sz="1400" dirty="0"/>
+          </a:p>
+          <a:p>
+            <a:pPr marL="914400" lvl="1" indent="-317500" algn="l" rtl="0">
+              <a:spcBef>
+                <a:spcPts val="0"/>
+              </a:spcBef>
+              <a:spcAft>
+                <a:spcPts val="0"/>
+              </a:spcAft>
+              <a:buSzPts val="1400"/>
+              <a:buChar char="•"/>
+            </a:pPr>
+            <a:r>
+              <a:rPr lang="en-US" sz="1400" dirty="0"/>
+              <a:t>CSMA: Intervention to use a-priori carrier sensing</a:t>
+            </a:r>
+            <a:endParaRPr sz="1400" dirty="0"/>
+          </a:p>
+          <a:p>
+            <a:pPr lvl="0" indent="-317500">
+              <a:spcBef>
+                <a:spcPts val="0"/>
+              </a:spcBef>
+              <a:buSzPts val="1400"/>
+            </a:pPr>
+            <a:r>
+              <a:rPr lang="en-US" sz="1400" dirty="0"/>
+              <a:t>Following results are for CSMA approach using the </a:t>
+            </a:r>
+            <a:r>
+              <a:rPr lang="en-US" sz="1400" b="1" dirty="0"/>
+              <a:t>frac = 0.5</a:t>
+            </a:r>
+            <a:r>
+              <a:rPr lang="en-US" sz="1400" dirty="0"/>
+              <a:t>, </a:t>
+            </a:r>
+            <a:r>
+              <a:rPr lang="en-US" sz="1400" b="1" dirty="0"/>
+              <a:t>half Power Amplification as SEC, </a:t>
+            </a:r>
+            <a:r>
+              <a:rPr lang="en-US" sz="1400" b="1" dirty="0">
+                <a:solidFill>
+                  <a:srgbClr val="000000"/>
+                </a:solidFill>
+              </a:rPr>
+              <a:t>10% increase in probability </a:t>
+            </a:r>
+            <a:r>
+              <a:rPr lang="en-US" sz="1400" b="1" dirty="0" err="1">
+                <a:solidFill>
+                  <a:srgbClr val="000000"/>
+                </a:solidFill>
+              </a:rPr>
+              <a:t>p_CMB</a:t>
+            </a:r>
+            <a:endParaRPr sz="1400" b="1" dirty="0"/>
+          </a:p>
+        </p:txBody>
+      </p:sp>
+      <p:sp>
+        <p:nvSpPr>
+          <p:cNvPr id="187" name="Google Shape;187;p28"/>
+          <p:cNvSpPr txBox="1"/>
+          <p:nvPr/>
+        </p:nvSpPr>
+        <p:spPr>
+          <a:xfrm rot="-5400000">
+            <a:off x="196925" y="4442850"/>
+            <a:ext cx="2382600" cy="354900"/>
+          </a:xfrm>
+          <a:prstGeom prst="rect">
+            <a:avLst/>
+          </a:prstGeom>
+          <a:noFill/>
+          <a:ln>
+            <a:noFill/>
+          </a:ln>
+        </p:spPr>
+        <p:txBody>
+          <a:bodyPr spcFirstLastPara="1" wrap="square" lIns="91425" tIns="91425" rIns="91425" bIns="91425" anchor="t" anchorCtr="0">
+            <a:noAutofit/>
+          </a:bodyPr>
+          <a:lstStyle/>
+          <a:p>
+            <a:pPr marL="0" lvl="0" indent="0" algn="l" rtl="0">
+              <a:spcBef>
+                <a:spcPts val="0"/>
+              </a:spcBef>
+              <a:spcAft>
+                <a:spcPts val="0"/>
+              </a:spcAft>
+              <a:buNone/>
+            </a:pPr>
+            <a:r>
+              <a:rPr lang="en-US" dirty="0"/>
+              <a:t>Inverse Standard Deviation</a:t>
+            </a:r>
+            <a:endParaRPr dirty="0"/>
+          </a:p>
+        </p:txBody>
+      </p:sp>
+      <p:sp>
+        <p:nvSpPr>
+          <p:cNvPr id="188" name="Google Shape;188;p28"/>
+          <p:cNvSpPr txBox="1"/>
+          <p:nvPr/>
+        </p:nvSpPr>
+        <p:spPr>
+          <a:xfrm>
+            <a:off x="3683550" y="6390175"/>
+            <a:ext cx="1776900" cy="354900"/>
+          </a:xfrm>
+          <a:prstGeom prst="rect">
+            <a:avLst/>
+          </a:prstGeom>
+          <a:noFill/>
+          <a:ln>
+            <a:noFill/>
+          </a:ln>
+        </p:spPr>
+        <p:txBody>
+          <a:bodyPr spcFirstLastPara="1" wrap="square" lIns="91425" tIns="91425" rIns="91425" bIns="91425" anchor="t" anchorCtr="0">
+            <a:noAutofit/>
+          </a:bodyPr>
+          <a:lstStyle/>
+          <a:p>
+            <a:pPr marL="0" lvl="0" indent="0" algn="l" rtl="0">
+              <a:spcBef>
+                <a:spcPts val="0"/>
+              </a:spcBef>
+              <a:spcAft>
+                <a:spcPts val="0"/>
+              </a:spcAft>
+              <a:buNone/>
+            </a:pPr>
+            <a:r>
+              <a:rPr lang="en-US"/>
+              <a:t>Interfering Cameras</a:t>
+            </a:r>
+            <a:endParaRPr/>
+          </a:p>
+        </p:txBody>
+      </p:sp>
+      <p:pic>
+        <p:nvPicPr>
+          <p:cNvPr id="9" name="Picture 8">
+            <a:extLst>
+              <a:ext uri="{FF2B5EF4-FFF2-40B4-BE49-F238E27FC236}">
+                <a16:creationId xmlns:a16="http://schemas.microsoft.com/office/drawing/2014/main" id="{20179DEB-1FCC-7F46-8F74-E0800D9921B1}"/>
+              </a:ext>
+            </a:extLst>
+          </p:cNvPr>
+          <p:cNvPicPr>
+            <a:picLocks noChangeAspect="1"/>
+          </p:cNvPicPr>
+          <p:nvPr/>
+        </p:nvPicPr>
+        <p:blipFill>
+          <a:blip r:embed="rId3"/>
+          <a:srcRect/>
+          <a:stretch/>
+        </p:blipFill>
+        <p:spPr>
+          <a:xfrm>
+            <a:off x="1629295" y="2992582"/>
+            <a:ext cx="6749933" cy="3513664"/>
+          </a:xfrm>
+          <a:prstGeom prst="rect">
+            <a:avLst/>
+          </a:prstGeom>
+        </p:spPr>
+      </p:pic>
+    </p:spTree>
+    <p:extLst>
+      <p:ext uri="{BB962C8B-B14F-4D97-AF65-F5344CB8AC3E}">
+        <p14:creationId xmlns:p14="http://schemas.microsoft.com/office/powerpoint/2010/main" val="1014085555"/>
+      </p:ext>
+    </p:extLst>
+  </p:cSld>
+  <p:clrMapOvr>
+    <a:masterClrMapping/>
+  </p:clrMapOvr>
+</p:sld>
+</file>
+
+<file path=ppt/slides/slide22.xml><?xml version="1.0" encoding="utf-8"?>
+<p:sld xmlns:a="http://schemas.openxmlformats.org/drawingml/2006/main" xmlns:r="http://schemas.openxmlformats.org/officeDocument/2006/relationships" xmlns:p="http://schemas.openxmlformats.org/presentationml/2006/main">
+  <p:cSld>
+    <p:spTree>
+      <p:nvGrpSpPr>
+        <p:cNvPr id="1" name="Shape 183"/>
+        <p:cNvGrpSpPr/>
+        <p:nvPr/>
+      </p:nvGrpSpPr>
+      <p:grpSpPr>
+        <a:xfrm>
+          <a:off x="0" y="0"/>
+          <a:ext cx="0" cy="0"/>
+          <a:chOff x="0" y="0"/>
+          <a:chExt cx="0" cy="0"/>
+        </a:xfrm>
+      </p:grpSpPr>
+      <p:sp>
+        <p:nvSpPr>
+          <p:cNvPr id="184" name="Google Shape;184;p28"/>
+          <p:cNvSpPr txBox="1">
+            <a:spLocks noGrp="1"/>
+          </p:cNvSpPr>
+          <p:nvPr>
+            <p:ph type="title"/>
+          </p:nvPr>
+        </p:nvSpPr>
+        <p:spPr>
+          <a:xfrm>
+            <a:off x="628650" y="316372"/>
+            <a:ext cx="7886700" cy="640800"/>
+          </a:xfrm>
+          <a:prstGeom prst="rect">
+            <a:avLst/>
+          </a:prstGeom>
+        </p:spPr>
+        <p:txBody>
+          <a:bodyPr spcFirstLastPara="1" wrap="square" lIns="91425" tIns="91425" rIns="91425" bIns="91425" anchor="ctr" anchorCtr="0">
+            <a:noAutofit/>
+          </a:bodyPr>
+          <a:lstStyle/>
+          <a:p>
+            <a:pPr marL="0" lvl="0" indent="0" algn="l" rtl="0">
+              <a:spcBef>
+                <a:spcPts val="0"/>
+              </a:spcBef>
+              <a:spcAft>
+                <a:spcPts val="0"/>
+              </a:spcAft>
+              <a:buNone/>
+            </a:pPr>
+            <a:r>
+              <a:rPr lang="en-US"/>
+              <a:t>Results: Simulation</a:t>
+            </a:r>
+            <a:endParaRPr/>
+          </a:p>
+        </p:txBody>
+      </p:sp>
+      <p:sp>
+        <p:nvSpPr>
+          <p:cNvPr id="185" name="Google Shape;185;p28"/>
+          <p:cNvSpPr txBox="1">
+            <a:spLocks noGrp="1"/>
+          </p:cNvSpPr>
+          <p:nvPr>
+            <p:ph type="body" idx="1"/>
+          </p:nvPr>
+        </p:nvSpPr>
+        <p:spPr>
+          <a:xfrm>
+            <a:off x="628650" y="1102346"/>
+            <a:ext cx="7886700" cy="5049000"/>
+          </a:xfrm>
+          <a:prstGeom prst="rect">
+            <a:avLst/>
+          </a:prstGeom>
+        </p:spPr>
+        <p:txBody>
+          <a:bodyPr spcFirstLastPara="1" wrap="square" lIns="91425" tIns="91425" rIns="91425" bIns="91425" anchor="t" anchorCtr="0">
+            <a:noAutofit/>
+          </a:bodyPr>
+          <a:lstStyle/>
+          <a:p>
+            <a:pPr marL="457200" lvl="0" indent="-336550" algn="l" rtl="0">
+              <a:spcBef>
+                <a:spcPts val="750"/>
+              </a:spcBef>
+              <a:spcAft>
+                <a:spcPts val="0"/>
+              </a:spcAft>
+              <a:buSzPts val="1700"/>
+              <a:buChar char="•"/>
+            </a:pPr>
+            <a:r>
+              <a:rPr lang="en-US" sz="1700" dirty="0"/>
+              <a:t>Comparison Baselines:</a:t>
+            </a:r>
+            <a:endParaRPr sz="1700" dirty="0"/>
+          </a:p>
+          <a:p>
+            <a:pPr marL="914400" lvl="1" indent="-317500" algn="l" rtl="0">
+              <a:spcBef>
+                <a:spcPts val="0"/>
+              </a:spcBef>
+              <a:spcAft>
+                <a:spcPts val="0"/>
+              </a:spcAft>
+              <a:buSzPts val="1400"/>
+              <a:buChar char="•"/>
+            </a:pPr>
+            <a:r>
+              <a:rPr lang="en-US" sz="1400" dirty="0"/>
+              <a:t>PN (</a:t>
+            </a:r>
+            <a:r>
+              <a:rPr lang="en-US" sz="1400" dirty="0" err="1"/>
+              <a:t>Pseudonoise</a:t>
+            </a:r>
+            <a:r>
+              <a:rPr lang="en-US" sz="1400" dirty="0"/>
+              <a:t>): Uses non-sinusoid modulation and demodulation functions. </a:t>
+            </a:r>
+            <a:endParaRPr sz="1400" dirty="0"/>
+          </a:p>
+          <a:p>
+            <a:pPr marL="914400" lvl="1" indent="-317500" algn="l" rtl="0">
+              <a:spcBef>
+                <a:spcPts val="0"/>
+              </a:spcBef>
+              <a:spcAft>
+                <a:spcPts val="0"/>
+              </a:spcAft>
+              <a:buSzPts val="1400"/>
+              <a:buChar char="•"/>
+            </a:pPr>
+            <a:r>
+              <a:rPr lang="en-US" sz="1400" dirty="0"/>
+              <a:t>ACO (AC Orthogonal): Using orthogonal frequencies for the interfering cameras. </a:t>
+            </a:r>
+            <a:endParaRPr sz="1400" dirty="0"/>
+          </a:p>
+          <a:p>
+            <a:pPr marL="914400" lvl="1" indent="-317500" algn="l" rtl="0">
+              <a:spcBef>
+                <a:spcPts val="0"/>
+              </a:spcBef>
+              <a:spcAft>
+                <a:spcPts val="0"/>
+              </a:spcAft>
+              <a:buSzPts val="1400"/>
+              <a:buChar char="•"/>
+            </a:pPr>
+            <a:r>
+              <a:rPr lang="en-US" sz="1400" dirty="0"/>
+              <a:t>SEC (Stochastic Exposure Coding): Makes use of a stochastic TDMA protocol</a:t>
+            </a:r>
+            <a:endParaRPr sz="1400" dirty="0"/>
+          </a:p>
+          <a:p>
+            <a:pPr marL="914400" lvl="1" indent="-317500" algn="l" rtl="0">
+              <a:spcBef>
+                <a:spcPts val="0"/>
+              </a:spcBef>
+              <a:spcAft>
+                <a:spcPts val="0"/>
+              </a:spcAft>
+              <a:buSzPts val="1400"/>
+              <a:buChar char="•"/>
+            </a:pPr>
+            <a:r>
+              <a:rPr lang="en-US" sz="1400" dirty="0"/>
+              <a:t>CMB: Combined ACO and SEC</a:t>
+            </a:r>
+            <a:endParaRPr sz="1400" dirty="0"/>
+          </a:p>
+          <a:p>
+            <a:pPr marL="914400" lvl="1" indent="-317500" algn="l" rtl="0">
+              <a:spcBef>
+                <a:spcPts val="0"/>
+              </a:spcBef>
+              <a:spcAft>
+                <a:spcPts val="0"/>
+              </a:spcAft>
+              <a:buSzPts val="1400"/>
+              <a:buChar char="•"/>
+            </a:pPr>
+            <a:r>
+              <a:rPr lang="en-US" sz="1400" dirty="0"/>
+              <a:t>CSMA: Intervention to use a-priori carrier sensing</a:t>
+            </a:r>
+            <a:endParaRPr sz="1400" dirty="0"/>
+          </a:p>
+          <a:p>
+            <a:pPr lvl="0" indent="-317500">
+              <a:spcBef>
+                <a:spcPts val="0"/>
+              </a:spcBef>
+              <a:buSzPts val="1400"/>
+            </a:pPr>
+            <a:r>
+              <a:rPr lang="en-US" sz="1400" dirty="0"/>
+              <a:t>Following results are for CSMA approach using the </a:t>
+            </a:r>
+            <a:r>
+              <a:rPr lang="en-US" sz="1400" b="1" dirty="0"/>
+              <a:t>frac = 0.5</a:t>
+            </a:r>
+            <a:r>
+              <a:rPr lang="en-US" sz="1400" dirty="0"/>
+              <a:t>, </a:t>
+            </a:r>
+            <a:r>
+              <a:rPr lang="en-US" sz="1400" b="1" dirty="0"/>
+              <a:t>75% Power Amplification as SEC, </a:t>
+            </a:r>
+            <a:r>
+              <a:rPr lang="en-US" sz="1400" b="1" dirty="0">
+                <a:solidFill>
+                  <a:srgbClr val="000000"/>
+                </a:solidFill>
+              </a:rPr>
+              <a:t>10% increase in probability </a:t>
+            </a:r>
+            <a:r>
+              <a:rPr lang="en-US" sz="1400" b="1" dirty="0" err="1">
+                <a:solidFill>
+                  <a:srgbClr val="000000"/>
+                </a:solidFill>
+              </a:rPr>
+              <a:t>p_CMB</a:t>
+            </a:r>
+            <a:endParaRPr sz="1400" b="1" dirty="0"/>
+          </a:p>
+        </p:txBody>
+      </p:sp>
+      <p:sp>
+        <p:nvSpPr>
+          <p:cNvPr id="187" name="Google Shape;187;p28"/>
+          <p:cNvSpPr txBox="1"/>
+          <p:nvPr/>
+        </p:nvSpPr>
+        <p:spPr>
+          <a:xfrm rot="-5400000">
+            <a:off x="196925" y="4442850"/>
+            <a:ext cx="2382600" cy="354900"/>
+          </a:xfrm>
+          <a:prstGeom prst="rect">
+            <a:avLst/>
+          </a:prstGeom>
+          <a:noFill/>
+          <a:ln>
+            <a:noFill/>
+          </a:ln>
+        </p:spPr>
+        <p:txBody>
+          <a:bodyPr spcFirstLastPara="1" wrap="square" lIns="91425" tIns="91425" rIns="91425" bIns="91425" anchor="t" anchorCtr="0">
+            <a:noAutofit/>
+          </a:bodyPr>
+          <a:lstStyle/>
+          <a:p>
+            <a:pPr marL="0" lvl="0" indent="0" algn="l" rtl="0">
+              <a:spcBef>
+                <a:spcPts val="0"/>
+              </a:spcBef>
+              <a:spcAft>
+                <a:spcPts val="0"/>
+              </a:spcAft>
+              <a:buNone/>
+            </a:pPr>
+            <a:r>
+              <a:rPr lang="en-US" dirty="0"/>
+              <a:t>Inverse Standard Deviation</a:t>
+            </a:r>
+            <a:endParaRPr dirty="0"/>
+          </a:p>
+        </p:txBody>
+      </p:sp>
+      <p:sp>
+        <p:nvSpPr>
+          <p:cNvPr id="188" name="Google Shape;188;p28"/>
+          <p:cNvSpPr txBox="1"/>
+          <p:nvPr/>
+        </p:nvSpPr>
+        <p:spPr>
+          <a:xfrm>
+            <a:off x="3683550" y="6390175"/>
+            <a:ext cx="1776900" cy="354900"/>
+          </a:xfrm>
+          <a:prstGeom prst="rect">
+            <a:avLst/>
+          </a:prstGeom>
+          <a:noFill/>
+          <a:ln>
+            <a:noFill/>
+          </a:ln>
+        </p:spPr>
+        <p:txBody>
+          <a:bodyPr spcFirstLastPara="1" wrap="square" lIns="91425" tIns="91425" rIns="91425" bIns="91425" anchor="t" anchorCtr="0">
+            <a:noAutofit/>
+          </a:bodyPr>
+          <a:lstStyle/>
+          <a:p>
+            <a:pPr marL="0" lvl="0" indent="0" algn="l" rtl="0">
+              <a:spcBef>
+                <a:spcPts val="0"/>
+              </a:spcBef>
+              <a:spcAft>
+                <a:spcPts val="0"/>
+              </a:spcAft>
+              <a:buNone/>
+            </a:pPr>
+            <a:r>
+              <a:rPr lang="en-US"/>
+              <a:t>Interfering Cameras</a:t>
+            </a:r>
+            <a:endParaRPr/>
+          </a:p>
+        </p:txBody>
+      </p:sp>
+      <p:pic>
+        <p:nvPicPr>
+          <p:cNvPr id="9" name="Picture 8">
+            <a:extLst>
+              <a:ext uri="{FF2B5EF4-FFF2-40B4-BE49-F238E27FC236}">
+                <a16:creationId xmlns:a16="http://schemas.microsoft.com/office/drawing/2014/main" id="{20179DEB-1FCC-7F46-8F74-E0800D9921B1}"/>
+              </a:ext>
+            </a:extLst>
+          </p:cNvPr>
+          <p:cNvPicPr>
+            <a:picLocks noChangeAspect="1"/>
+          </p:cNvPicPr>
+          <p:nvPr/>
+        </p:nvPicPr>
+        <p:blipFill>
+          <a:blip r:embed="rId3"/>
+          <a:srcRect/>
+          <a:stretch/>
+        </p:blipFill>
+        <p:spPr>
+          <a:xfrm>
+            <a:off x="1729047" y="2992582"/>
+            <a:ext cx="6600306" cy="3513664"/>
+          </a:xfrm>
+          <a:prstGeom prst="rect">
+            <a:avLst/>
+          </a:prstGeom>
+        </p:spPr>
+      </p:pic>
+    </p:spTree>
+    <p:extLst>
+      <p:ext uri="{BB962C8B-B14F-4D97-AF65-F5344CB8AC3E}">
+        <p14:creationId xmlns:p14="http://schemas.microsoft.com/office/powerpoint/2010/main" val="3383716536"/>
+      </p:ext>
+    </p:extLst>
+  </p:cSld>
+  <p:clrMapOvr>
+    <a:masterClrMapping/>
+  </p:clrMapOvr>
+</p:sld>
+</file>
+
+<file path=ppt/slides/slide23.xml><?xml version="1.0" encoding="utf-8"?>
+<p:sld xmlns:a="http://schemas.openxmlformats.org/drawingml/2006/main" xmlns:r="http://schemas.openxmlformats.org/officeDocument/2006/relationships" xmlns:p="http://schemas.openxmlformats.org/presentationml/2006/main">
+  <p:cSld>
+    <p:spTree>
+      <p:nvGrpSpPr>
+        <p:cNvPr id="1" name="Shape 183"/>
+        <p:cNvGrpSpPr/>
+        <p:nvPr/>
+      </p:nvGrpSpPr>
+      <p:grpSpPr>
+        <a:xfrm>
+          <a:off x="0" y="0"/>
+          <a:ext cx="0" cy="0"/>
+          <a:chOff x="0" y="0"/>
+          <a:chExt cx="0" cy="0"/>
+        </a:xfrm>
+      </p:grpSpPr>
+      <p:sp>
+        <p:nvSpPr>
+          <p:cNvPr id="184" name="Google Shape;184;p28"/>
+          <p:cNvSpPr txBox="1">
+            <a:spLocks noGrp="1"/>
+          </p:cNvSpPr>
+          <p:nvPr>
+            <p:ph type="title"/>
+          </p:nvPr>
+        </p:nvSpPr>
+        <p:spPr>
+          <a:xfrm>
+            <a:off x="628650" y="316372"/>
+            <a:ext cx="7886700" cy="640800"/>
+          </a:xfrm>
+          <a:prstGeom prst="rect">
+            <a:avLst/>
+          </a:prstGeom>
+        </p:spPr>
+        <p:txBody>
+          <a:bodyPr spcFirstLastPara="1" wrap="square" lIns="91425" tIns="91425" rIns="91425" bIns="91425" anchor="ctr" anchorCtr="0">
+            <a:noAutofit/>
+          </a:bodyPr>
+          <a:lstStyle/>
+          <a:p>
+            <a:pPr marL="0" lvl="0" indent="0" algn="l" rtl="0">
+              <a:spcBef>
+                <a:spcPts val="0"/>
+              </a:spcBef>
+              <a:spcAft>
+                <a:spcPts val="0"/>
+              </a:spcAft>
+              <a:buNone/>
+            </a:pPr>
+            <a:r>
+              <a:rPr lang="en-US"/>
+              <a:t>Results: Simulation</a:t>
+            </a:r>
+            <a:endParaRPr/>
+          </a:p>
+        </p:txBody>
+      </p:sp>
+      <p:sp>
+        <p:nvSpPr>
+          <p:cNvPr id="185" name="Google Shape;185;p28"/>
+          <p:cNvSpPr txBox="1">
+            <a:spLocks noGrp="1"/>
+          </p:cNvSpPr>
+          <p:nvPr>
+            <p:ph type="body" idx="1"/>
+          </p:nvPr>
+        </p:nvSpPr>
+        <p:spPr>
+          <a:xfrm>
+            <a:off x="628650" y="1102346"/>
+            <a:ext cx="7886700" cy="5049000"/>
+          </a:xfrm>
+          <a:prstGeom prst="rect">
+            <a:avLst/>
+          </a:prstGeom>
+        </p:spPr>
+        <p:txBody>
+          <a:bodyPr spcFirstLastPara="1" wrap="square" lIns="91425" tIns="91425" rIns="91425" bIns="91425" anchor="t" anchorCtr="0">
+            <a:noAutofit/>
+          </a:bodyPr>
+          <a:lstStyle/>
+          <a:p>
+            <a:pPr marL="457200" lvl="0" indent="-336550" algn="l" rtl="0">
+              <a:spcBef>
+                <a:spcPts val="750"/>
+              </a:spcBef>
+              <a:spcAft>
+                <a:spcPts val="0"/>
+              </a:spcAft>
+              <a:buSzPts val="1700"/>
+              <a:buChar char="•"/>
+            </a:pPr>
+            <a:r>
+              <a:rPr lang="en-US" sz="1700" dirty="0"/>
+              <a:t>Comparison Baselines:</a:t>
+            </a:r>
+            <a:endParaRPr sz="1700" dirty="0"/>
+          </a:p>
+          <a:p>
+            <a:pPr marL="914400" lvl="1" indent="-317500" algn="l" rtl="0">
+              <a:spcBef>
+                <a:spcPts val="0"/>
+              </a:spcBef>
+              <a:spcAft>
+                <a:spcPts val="0"/>
+              </a:spcAft>
+              <a:buSzPts val="1400"/>
+              <a:buChar char="•"/>
+            </a:pPr>
+            <a:r>
+              <a:rPr lang="en-US" sz="1400" dirty="0"/>
+              <a:t>PN (</a:t>
+            </a:r>
+            <a:r>
+              <a:rPr lang="en-US" sz="1400" dirty="0" err="1"/>
+              <a:t>Pseudonoise</a:t>
+            </a:r>
+            <a:r>
+              <a:rPr lang="en-US" sz="1400" dirty="0"/>
+              <a:t>): Uses non-sinusoid modulation and demodulation functions. </a:t>
+            </a:r>
+            <a:endParaRPr sz="1400" dirty="0"/>
+          </a:p>
+          <a:p>
+            <a:pPr marL="914400" lvl="1" indent="-317500" algn="l" rtl="0">
+              <a:spcBef>
+                <a:spcPts val="0"/>
+              </a:spcBef>
+              <a:spcAft>
+                <a:spcPts val="0"/>
+              </a:spcAft>
+              <a:buSzPts val="1400"/>
+              <a:buChar char="•"/>
+            </a:pPr>
+            <a:r>
+              <a:rPr lang="en-US" sz="1400" dirty="0"/>
+              <a:t>ACO (AC Orthogonal): Using orthogonal frequencies for the interfering cameras. </a:t>
+            </a:r>
+            <a:endParaRPr sz="1400" dirty="0"/>
+          </a:p>
+          <a:p>
+            <a:pPr marL="914400" lvl="1" indent="-317500" algn="l" rtl="0">
+              <a:spcBef>
+                <a:spcPts val="0"/>
+              </a:spcBef>
+              <a:spcAft>
+                <a:spcPts val="0"/>
+              </a:spcAft>
+              <a:buSzPts val="1400"/>
+              <a:buChar char="•"/>
+            </a:pPr>
+            <a:r>
+              <a:rPr lang="en-US" sz="1400" dirty="0"/>
+              <a:t>SEC (Stochastic Exposure Coding): Makes use of a stochastic TDMA protocol</a:t>
+            </a:r>
+            <a:endParaRPr sz="1400" dirty="0"/>
+          </a:p>
+          <a:p>
+            <a:pPr marL="914400" lvl="1" indent="-317500" algn="l" rtl="0">
+              <a:spcBef>
+                <a:spcPts val="0"/>
+              </a:spcBef>
+              <a:spcAft>
+                <a:spcPts val="0"/>
+              </a:spcAft>
+              <a:buSzPts val="1400"/>
+              <a:buChar char="•"/>
+            </a:pPr>
+            <a:r>
+              <a:rPr lang="en-US" sz="1400" dirty="0"/>
+              <a:t>CMB: Combined ACO and SEC</a:t>
+            </a:r>
+            <a:endParaRPr sz="1400" dirty="0"/>
+          </a:p>
+          <a:p>
+            <a:pPr marL="914400" lvl="1" indent="-317500" algn="l" rtl="0">
+              <a:spcBef>
+                <a:spcPts val="0"/>
+              </a:spcBef>
+              <a:spcAft>
+                <a:spcPts val="0"/>
+              </a:spcAft>
+              <a:buSzPts val="1400"/>
+              <a:buChar char="•"/>
+            </a:pPr>
+            <a:r>
+              <a:rPr lang="en-US" sz="1400" dirty="0"/>
+              <a:t>CSMA: Intervention to use a-priori carrier sensing</a:t>
+            </a:r>
+            <a:endParaRPr sz="1400" dirty="0"/>
+          </a:p>
+          <a:p>
+            <a:pPr lvl="0" indent="-317500">
+              <a:spcBef>
+                <a:spcPts val="0"/>
+              </a:spcBef>
+              <a:buSzPts val="1400"/>
+            </a:pPr>
+            <a:r>
+              <a:rPr lang="en-US" sz="1400" dirty="0"/>
+              <a:t>Following results are for CSMA approach using the </a:t>
+            </a:r>
+            <a:r>
+              <a:rPr lang="en-US" sz="1400" b="1" dirty="0"/>
+              <a:t>frac = 0.5</a:t>
+            </a:r>
+            <a:r>
+              <a:rPr lang="en-US" sz="1400" dirty="0"/>
+              <a:t>, </a:t>
+            </a:r>
+            <a:r>
+              <a:rPr lang="en-US" sz="1400" b="1" dirty="0"/>
+              <a:t>same Amplification as SEC, </a:t>
+            </a:r>
+            <a:r>
+              <a:rPr lang="en-US" sz="1400" b="1" dirty="0">
+                <a:solidFill>
+                  <a:srgbClr val="000000"/>
+                </a:solidFill>
+              </a:rPr>
+              <a:t>10% increase in probability </a:t>
+            </a:r>
+            <a:r>
+              <a:rPr lang="en-US" sz="1400" b="1" dirty="0" err="1">
+                <a:solidFill>
+                  <a:srgbClr val="000000"/>
+                </a:solidFill>
+              </a:rPr>
+              <a:t>p_CMB</a:t>
+            </a:r>
+            <a:endParaRPr sz="1400" b="1" dirty="0"/>
+          </a:p>
+        </p:txBody>
+      </p:sp>
+      <p:sp>
+        <p:nvSpPr>
+          <p:cNvPr id="187" name="Google Shape;187;p28"/>
+          <p:cNvSpPr txBox="1"/>
+          <p:nvPr/>
+        </p:nvSpPr>
+        <p:spPr>
+          <a:xfrm rot="-5400000">
+            <a:off x="196925" y="4442850"/>
+            <a:ext cx="2382600" cy="354900"/>
+          </a:xfrm>
+          <a:prstGeom prst="rect">
+            <a:avLst/>
+          </a:prstGeom>
+          <a:noFill/>
+          <a:ln>
+            <a:noFill/>
+          </a:ln>
+        </p:spPr>
+        <p:txBody>
+          <a:bodyPr spcFirstLastPara="1" wrap="square" lIns="91425" tIns="91425" rIns="91425" bIns="91425" anchor="t" anchorCtr="0">
+            <a:noAutofit/>
+          </a:bodyPr>
+          <a:lstStyle/>
+          <a:p>
+            <a:pPr marL="0" lvl="0" indent="0" algn="l" rtl="0">
+              <a:spcBef>
+                <a:spcPts val="0"/>
+              </a:spcBef>
+              <a:spcAft>
+                <a:spcPts val="0"/>
+              </a:spcAft>
+              <a:buNone/>
+            </a:pPr>
+            <a:r>
+              <a:rPr lang="en-US" dirty="0"/>
+              <a:t>Inverse Standard Deviation</a:t>
+            </a:r>
+            <a:endParaRPr dirty="0"/>
+          </a:p>
+        </p:txBody>
+      </p:sp>
+      <p:sp>
+        <p:nvSpPr>
+          <p:cNvPr id="188" name="Google Shape;188;p28"/>
+          <p:cNvSpPr txBox="1"/>
+          <p:nvPr/>
+        </p:nvSpPr>
+        <p:spPr>
+          <a:xfrm>
+            <a:off x="3683550" y="6390175"/>
+            <a:ext cx="1776900" cy="354900"/>
+          </a:xfrm>
+          <a:prstGeom prst="rect">
+            <a:avLst/>
+          </a:prstGeom>
+          <a:noFill/>
+          <a:ln>
+            <a:noFill/>
+          </a:ln>
+        </p:spPr>
+        <p:txBody>
+          <a:bodyPr spcFirstLastPara="1" wrap="square" lIns="91425" tIns="91425" rIns="91425" bIns="91425" anchor="t" anchorCtr="0">
+            <a:noAutofit/>
+          </a:bodyPr>
+          <a:lstStyle/>
+          <a:p>
+            <a:pPr marL="0" lvl="0" indent="0" algn="l" rtl="0">
+              <a:spcBef>
+                <a:spcPts val="0"/>
+              </a:spcBef>
+              <a:spcAft>
+                <a:spcPts val="0"/>
+              </a:spcAft>
+              <a:buNone/>
+            </a:pPr>
+            <a:r>
+              <a:rPr lang="en-US"/>
+              <a:t>Interfering Cameras</a:t>
+            </a:r>
+            <a:endParaRPr/>
+          </a:p>
+        </p:txBody>
+      </p:sp>
+      <p:pic>
+        <p:nvPicPr>
+          <p:cNvPr id="9" name="Picture 8">
+            <a:extLst>
+              <a:ext uri="{FF2B5EF4-FFF2-40B4-BE49-F238E27FC236}">
+                <a16:creationId xmlns:a16="http://schemas.microsoft.com/office/drawing/2014/main" id="{20179DEB-1FCC-7F46-8F74-E0800D9921B1}"/>
+              </a:ext>
+            </a:extLst>
+          </p:cNvPr>
+          <p:cNvPicPr>
+            <a:picLocks noChangeAspect="1"/>
+          </p:cNvPicPr>
+          <p:nvPr/>
+        </p:nvPicPr>
+        <p:blipFill>
+          <a:blip r:embed="rId3"/>
+          <a:srcRect/>
+          <a:stretch/>
+        </p:blipFill>
+        <p:spPr>
+          <a:xfrm>
+            <a:off x="1637607" y="2992582"/>
+            <a:ext cx="6733309" cy="3513664"/>
+          </a:xfrm>
+          <a:prstGeom prst="rect">
+            <a:avLst/>
+          </a:prstGeom>
+        </p:spPr>
+      </p:pic>
+    </p:spTree>
+    <p:extLst>
+      <p:ext uri="{BB962C8B-B14F-4D97-AF65-F5344CB8AC3E}">
+        <p14:creationId xmlns:p14="http://schemas.microsoft.com/office/powerpoint/2010/main" val="387616553"/>
+      </p:ext>
+    </p:extLst>
+  </p:cSld>
+  <p:clrMapOvr>
+    <a:masterClrMapping/>
+  </p:clrMapOvr>
+</p:sld>
+</file>
+
+<file path=ppt/slides/slide24.xml><?xml version="1.0" encoding="utf-8"?>
+<p:sld xmlns:a="http://schemas.openxmlformats.org/drawingml/2006/main" xmlns:r="http://schemas.openxmlformats.org/officeDocument/2006/relationships" xmlns:p="http://schemas.openxmlformats.org/presentationml/2006/main">
+  <p:cSld>
+    <p:spTree>
+      <p:nvGrpSpPr>
+        <p:cNvPr id="1" name="Shape 183"/>
+        <p:cNvGrpSpPr/>
+        <p:nvPr/>
+      </p:nvGrpSpPr>
+      <p:grpSpPr>
+        <a:xfrm>
+          <a:off x="0" y="0"/>
+          <a:ext cx="0" cy="0"/>
+          <a:chOff x="0" y="0"/>
+          <a:chExt cx="0" cy="0"/>
+        </a:xfrm>
+      </p:grpSpPr>
+      <p:sp>
+        <p:nvSpPr>
+          <p:cNvPr id="184" name="Google Shape;184;p28"/>
+          <p:cNvSpPr txBox="1">
+            <a:spLocks noGrp="1"/>
+          </p:cNvSpPr>
+          <p:nvPr>
+            <p:ph type="title"/>
+          </p:nvPr>
+        </p:nvSpPr>
+        <p:spPr>
+          <a:xfrm>
+            <a:off x="628650" y="316372"/>
+            <a:ext cx="7886700" cy="640800"/>
+          </a:xfrm>
+          <a:prstGeom prst="rect">
+            <a:avLst/>
+          </a:prstGeom>
+        </p:spPr>
+        <p:txBody>
+          <a:bodyPr spcFirstLastPara="1" wrap="square" lIns="91425" tIns="91425" rIns="91425" bIns="91425" anchor="ctr" anchorCtr="0">
+            <a:noAutofit/>
+          </a:bodyPr>
+          <a:lstStyle/>
+          <a:p>
+            <a:pPr marL="0" lvl="0" indent="0" algn="l" rtl="0">
+              <a:spcBef>
+                <a:spcPts val="0"/>
+              </a:spcBef>
+              <a:spcAft>
+                <a:spcPts val="0"/>
+              </a:spcAft>
+              <a:buNone/>
+            </a:pPr>
+            <a:r>
+              <a:rPr lang="en-US"/>
+              <a:t>Results: Simulation</a:t>
+            </a:r>
+            <a:endParaRPr/>
+          </a:p>
+        </p:txBody>
+      </p:sp>
+      <p:sp>
+        <p:nvSpPr>
+          <p:cNvPr id="185" name="Google Shape;185;p28"/>
+          <p:cNvSpPr txBox="1">
+            <a:spLocks noGrp="1"/>
+          </p:cNvSpPr>
+          <p:nvPr>
+            <p:ph type="body" idx="1"/>
+          </p:nvPr>
+        </p:nvSpPr>
+        <p:spPr>
+          <a:xfrm>
+            <a:off x="628650" y="1102346"/>
+            <a:ext cx="7886700" cy="5049000"/>
+          </a:xfrm>
+          <a:prstGeom prst="rect">
+            <a:avLst/>
+          </a:prstGeom>
+        </p:spPr>
+        <p:txBody>
+          <a:bodyPr spcFirstLastPara="1" wrap="square" lIns="91425" tIns="91425" rIns="91425" bIns="91425" anchor="t" anchorCtr="0">
+            <a:noAutofit/>
+          </a:bodyPr>
+          <a:lstStyle/>
+          <a:p>
+            <a:pPr marL="457200" lvl="0" indent="-336550" algn="l" rtl="0">
+              <a:spcBef>
+                <a:spcPts val="750"/>
+              </a:spcBef>
+              <a:spcAft>
+                <a:spcPts val="0"/>
+              </a:spcAft>
+              <a:buSzPts val="1700"/>
+              <a:buChar char="•"/>
+            </a:pPr>
+            <a:r>
+              <a:rPr lang="en-US" sz="1700" dirty="0"/>
+              <a:t>Comparison Baselines:</a:t>
+            </a:r>
+            <a:endParaRPr sz="1700" dirty="0"/>
+          </a:p>
+          <a:p>
+            <a:pPr marL="914400" lvl="1" indent="-317500" algn="l" rtl="0">
+              <a:spcBef>
+                <a:spcPts val="0"/>
+              </a:spcBef>
+              <a:spcAft>
+                <a:spcPts val="0"/>
+              </a:spcAft>
+              <a:buSzPts val="1400"/>
+              <a:buChar char="•"/>
+            </a:pPr>
+            <a:r>
+              <a:rPr lang="en-US" sz="1400" dirty="0"/>
+              <a:t>PN (</a:t>
+            </a:r>
+            <a:r>
+              <a:rPr lang="en-US" sz="1400" dirty="0" err="1"/>
+              <a:t>Pseudonoise</a:t>
+            </a:r>
+            <a:r>
+              <a:rPr lang="en-US" sz="1400" dirty="0"/>
+              <a:t>): Uses non-sinusoid modulation and demodulation functions. </a:t>
+            </a:r>
+            <a:endParaRPr sz="1400" dirty="0"/>
+          </a:p>
+          <a:p>
+            <a:pPr marL="914400" lvl="1" indent="-317500" algn="l" rtl="0">
+              <a:spcBef>
+                <a:spcPts val="0"/>
+              </a:spcBef>
+              <a:spcAft>
+                <a:spcPts val="0"/>
+              </a:spcAft>
+              <a:buSzPts val="1400"/>
+              <a:buChar char="•"/>
+            </a:pPr>
+            <a:r>
+              <a:rPr lang="en-US" sz="1400" dirty="0"/>
+              <a:t>ACO (AC Orthogonal): Using orthogonal frequencies for the interfering cameras. </a:t>
+            </a:r>
+            <a:endParaRPr sz="1400" dirty="0"/>
+          </a:p>
+          <a:p>
+            <a:pPr marL="914400" lvl="1" indent="-317500" algn="l" rtl="0">
+              <a:spcBef>
+                <a:spcPts val="0"/>
+              </a:spcBef>
+              <a:spcAft>
+                <a:spcPts val="0"/>
+              </a:spcAft>
+              <a:buSzPts val="1400"/>
+              <a:buChar char="•"/>
+            </a:pPr>
+            <a:r>
+              <a:rPr lang="en-US" sz="1400" dirty="0"/>
+              <a:t>SEC (Stochastic Exposure Coding): Makes use of a stochastic TDMA protocol</a:t>
+            </a:r>
+            <a:endParaRPr sz="1400" dirty="0"/>
+          </a:p>
+          <a:p>
+            <a:pPr marL="914400" lvl="1" indent="-317500" algn="l" rtl="0">
+              <a:spcBef>
+                <a:spcPts val="0"/>
+              </a:spcBef>
+              <a:spcAft>
+                <a:spcPts val="0"/>
+              </a:spcAft>
+              <a:buSzPts val="1400"/>
+              <a:buChar char="•"/>
+            </a:pPr>
+            <a:r>
+              <a:rPr lang="en-US" sz="1400" dirty="0"/>
+              <a:t>CMB: Combined ACO and SEC</a:t>
+            </a:r>
+            <a:endParaRPr sz="1400" dirty="0"/>
+          </a:p>
+          <a:p>
+            <a:pPr marL="914400" lvl="1" indent="-317500" algn="l" rtl="0">
+              <a:spcBef>
+                <a:spcPts val="0"/>
+              </a:spcBef>
+              <a:spcAft>
+                <a:spcPts val="0"/>
+              </a:spcAft>
+              <a:buSzPts val="1400"/>
+              <a:buChar char="•"/>
+            </a:pPr>
+            <a:r>
+              <a:rPr lang="en-US" sz="1400" dirty="0"/>
+              <a:t>CSMA: Intervention to use a-priori carrier sensing</a:t>
+            </a:r>
+            <a:endParaRPr sz="1400" dirty="0"/>
+          </a:p>
+          <a:p>
+            <a:pPr lvl="0" indent="-317500">
+              <a:spcBef>
+                <a:spcPts val="0"/>
+              </a:spcBef>
+              <a:buSzPts val="1400"/>
+            </a:pPr>
+            <a:r>
+              <a:rPr lang="en-US" sz="1400" dirty="0"/>
+              <a:t>Following results are for CSMA approach using the </a:t>
+            </a:r>
+            <a:r>
+              <a:rPr lang="en-US" sz="1400" b="1" dirty="0"/>
+              <a:t>frac = 0.5</a:t>
+            </a:r>
+            <a:r>
+              <a:rPr lang="en-US" sz="1400" dirty="0"/>
+              <a:t>, </a:t>
+            </a:r>
+            <a:r>
+              <a:rPr lang="en-US" sz="1400" b="1" dirty="0"/>
+              <a:t>same Amplification as SEC, </a:t>
+            </a:r>
+            <a:r>
+              <a:rPr lang="en-US" sz="1400" b="1" dirty="0">
+                <a:solidFill>
+                  <a:srgbClr val="000000"/>
+                </a:solidFill>
+              </a:rPr>
+              <a:t>10% increase in probability </a:t>
+            </a:r>
+            <a:r>
+              <a:rPr lang="en-US" sz="1400" b="1" dirty="0" err="1">
+                <a:solidFill>
+                  <a:srgbClr val="000000"/>
+                </a:solidFill>
+              </a:rPr>
+              <a:t>p_CMB</a:t>
+            </a:r>
+            <a:endParaRPr sz="1400" b="1" dirty="0"/>
+          </a:p>
+        </p:txBody>
+      </p:sp>
+      <p:sp>
+        <p:nvSpPr>
+          <p:cNvPr id="187" name="Google Shape;187;p28"/>
+          <p:cNvSpPr txBox="1"/>
+          <p:nvPr/>
+        </p:nvSpPr>
+        <p:spPr>
+          <a:xfrm rot="-5400000">
+            <a:off x="196925" y="4442850"/>
+            <a:ext cx="2382600" cy="354900"/>
+          </a:xfrm>
+          <a:prstGeom prst="rect">
+            <a:avLst/>
+          </a:prstGeom>
+          <a:noFill/>
+          <a:ln>
+            <a:noFill/>
+          </a:ln>
+        </p:spPr>
+        <p:txBody>
+          <a:bodyPr spcFirstLastPara="1" wrap="square" lIns="91425" tIns="91425" rIns="91425" bIns="91425" anchor="t" anchorCtr="0">
+            <a:noAutofit/>
+          </a:bodyPr>
+          <a:lstStyle/>
+          <a:p>
+            <a:pPr marL="0" lvl="0" indent="0" algn="l" rtl="0">
+              <a:spcBef>
+                <a:spcPts val="0"/>
+              </a:spcBef>
+              <a:spcAft>
+                <a:spcPts val="0"/>
+              </a:spcAft>
+              <a:buNone/>
+            </a:pPr>
+            <a:r>
+              <a:rPr lang="en-US" dirty="0"/>
+              <a:t>Root Mean Square Error</a:t>
+            </a:r>
+            <a:endParaRPr dirty="0"/>
+          </a:p>
+        </p:txBody>
+      </p:sp>
+      <p:sp>
+        <p:nvSpPr>
+          <p:cNvPr id="188" name="Google Shape;188;p28"/>
+          <p:cNvSpPr txBox="1"/>
+          <p:nvPr/>
+        </p:nvSpPr>
+        <p:spPr>
+          <a:xfrm>
+            <a:off x="3683550" y="6390175"/>
+            <a:ext cx="1776900" cy="354900"/>
+          </a:xfrm>
+          <a:prstGeom prst="rect">
+            <a:avLst/>
+          </a:prstGeom>
+          <a:noFill/>
+          <a:ln>
+            <a:noFill/>
+          </a:ln>
+        </p:spPr>
+        <p:txBody>
+          <a:bodyPr spcFirstLastPara="1" wrap="square" lIns="91425" tIns="91425" rIns="91425" bIns="91425" anchor="t" anchorCtr="0">
+            <a:noAutofit/>
+          </a:bodyPr>
+          <a:lstStyle/>
+          <a:p>
+            <a:pPr marL="0" lvl="0" indent="0" algn="l" rtl="0">
+              <a:spcBef>
+                <a:spcPts val="0"/>
+              </a:spcBef>
+              <a:spcAft>
+                <a:spcPts val="0"/>
+              </a:spcAft>
+              <a:buNone/>
+            </a:pPr>
+            <a:r>
+              <a:rPr lang="en-US"/>
+              <a:t>Interfering Cameras</a:t>
+            </a:r>
+            <a:endParaRPr/>
+          </a:p>
+        </p:txBody>
+      </p:sp>
+      <p:pic>
+        <p:nvPicPr>
+          <p:cNvPr id="9" name="Picture 8">
+            <a:extLst>
+              <a:ext uri="{FF2B5EF4-FFF2-40B4-BE49-F238E27FC236}">
+                <a16:creationId xmlns:a16="http://schemas.microsoft.com/office/drawing/2014/main" id="{20179DEB-1FCC-7F46-8F74-E0800D9921B1}"/>
+              </a:ext>
+            </a:extLst>
+          </p:cNvPr>
+          <p:cNvPicPr>
+            <a:picLocks noChangeAspect="1"/>
+          </p:cNvPicPr>
+          <p:nvPr/>
+        </p:nvPicPr>
+        <p:blipFill>
+          <a:blip r:embed="rId3"/>
+          <a:srcRect/>
+          <a:stretch/>
+        </p:blipFill>
+        <p:spPr>
+          <a:xfrm>
+            <a:off x="1565675" y="2992582"/>
+            <a:ext cx="6949675" cy="3513664"/>
+          </a:xfrm>
+          <a:prstGeom prst="rect">
+            <a:avLst/>
+          </a:prstGeom>
+        </p:spPr>
+      </p:pic>
+    </p:spTree>
+    <p:extLst>
+      <p:ext uri="{BB962C8B-B14F-4D97-AF65-F5344CB8AC3E}">
+        <p14:creationId xmlns:p14="http://schemas.microsoft.com/office/powerpoint/2010/main" val="2571700462"/>
+      </p:ext>
+    </p:extLst>
+  </p:cSld>
+  <p:clrMapOvr>
+    <a:masterClrMapping/>
+  </p:clrMapOvr>
+</p:sld>
+</file>
+
+<file path=ppt/slides/slide25.xml><?xml version="1.0" encoding="utf-8"?>
+<p:sld xmlns:a="http://schemas.openxmlformats.org/drawingml/2006/main" xmlns:r="http://schemas.openxmlformats.org/officeDocument/2006/relationships" xmlns:p="http://schemas.openxmlformats.org/presentationml/2006/main">
+  <p:cSld>
+    <p:spTree>
+      <p:nvGrpSpPr>
+        <p:cNvPr id="1" name="Shape 217"/>
+        <p:cNvGrpSpPr/>
+        <p:nvPr/>
+      </p:nvGrpSpPr>
+      <p:grpSpPr>
+        <a:xfrm>
+          <a:off x="0" y="0"/>
+          <a:ext cx="0" cy="0"/>
+          <a:chOff x="0" y="0"/>
+          <a:chExt cx="0" cy="0"/>
+        </a:xfrm>
+      </p:grpSpPr>
+      <p:sp>
+        <p:nvSpPr>
+          <p:cNvPr id="218" name="Google Shape;218;p32"/>
+          <p:cNvSpPr txBox="1">
+            <a:spLocks noGrp="1"/>
+          </p:cNvSpPr>
+          <p:nvPr>
+            <p:ph type="title"/>
+          </p:nvPr>
+        </p:nvSpPr>
+        <p:spPr>
+          <a:xfrm>
+            <a:off x="628650" y="316372"/>
+            <a:ext cx="7886700" cy="640800"/>
+          </a:xfrm>
+          <a:prstGeom prst="rect">
+            <a:avLst/>
+          </a:prstGeom>
+        </p:spPr>
+        <p:txBody>
+          <a:bodyPr spcFirstLastPara="1" wrap="square" lIns="91425" tIns="91425" rIns="91425" bIns="91425" anchor="ctr" anchorCtr="0">
+            <a:noAutofit/>
+          </a:bodyPr>
+          <a:lstStyle/>
+          <a:p>
+            <a:pPr marL="0" lvl="0" indent="0" algn="l" rtl="0">
+              <a:spcBef>
+                <a:spcPts val="0"/>
+              </a:spcBef>
+              <a:spcAft>
+                <a:spcPts val="0"/>
+              </a:spcAft>
+              <a:buNone/>
+            </a:pPr>
+            <a:r>
+              <a:rPr lang="en-US" dirty="0"/>
+              <a:t>Conclusion</a:t>
+            </a:r>
+            <a:endParaRPr dirty="0"/>
+          </a:p>
+        </p:txBody>
+      </p:sp>
+      <p:sp>
+        <p:nvSpPr>
+          <p:cNvPr id="219" name="Google Shape;219;p32"/>
+          <p:cNvSpPr txBox="1">
+            <a:spLocks noGrp="1"/>
+          </p:cNvSpPr>
+          <p:nvPr>
+            <p:ph type="body" idx="1"/>
+          </p:nvPr>
+        </p:nvSpPr>
+        <p:spPr>
+          <a:xfrm>
+            <a:off x="628650" y="1230597"/>
+            <a:ext cx="7886700" cy="5049000"/>
+          </a:xfrm>
+          <a:prstGeom prst="rect">
+            <a:avLst/>
+          </a:prstGeom>
+        </p:spPr>
+        <p:txBody>
+          <a:bodyPr spcFirstLastPara="1" wrap="square" lIns="91425" tIns="91425" rIns="91425" bIns="91425" anchor="t" anchorCtr="0">
+            <a:noAutofit/>
+          </a:bodyPr>
+          <a:lstStyle/>
+          <a:p>
+            <a:pPr marL="457200" lvl="0" indent="-361950" algn="l" rtl="0">
+              <a:spcBef>
+                <a:spcPts val="750"/>
+              </a:spcBef>
+              <a:spcAft>
+                <a:spcPts val="0"/>
+              </a:spcAft>
+              <a:buSzPts val="2100"/>
+              <a:buChar char="•"/>
+            </a:pPr>
+            <a:r>
+              <a:rPr lang="en-US" dirty="0"/>
+              <a:t>CSMA approach does give a better performance over SEC under the same experimental setting.</a:t>
+            </a:r>
+          </a:p>
+          <a:p>
+            <a:pPr marL="457200" lvl="0" indent="-361950" algn="l" rtl="0">
+              <a:spcBef>
+                <a:spcPts val="750"/>
+              </a:spcBef>
+              <a:spcAft>
+                <a:spcPts val="0"/>
+              </a:spcAft>
+              <a:buSzPts val="2100"/>
+              <a:buChar char="•"/>
+            </a:pPr>
+            <a:r>
+              <a:rPr lang="en-US" dirty="0"/>
+              <a:t>There is a direct correlation between time spent in collision detection and the accuracy of estimated depth. </a:t>
+            </a:r>
+          </a:p>
+          <a:p>
+            <a:pPr marL="457200" lvl="0" indent="-361950" algn="l" rtl="0">
+              <a:spcBef>
+                <a:spcPts val="750"/>
+              </a:spcBef>
+              <a:spcAft>
+                <a:spcPts val="0"/>
+              </a:spcAft>
+              <a:buSzPts val="2100"/>
+              <a:buChar char="•"/>
+            </a:pPr>
+            <a:r>
+              <a:rPr lang="en-US" dirty="0"/>
+              <a:t>Reduction in depth estimation time can be compensated by increasing the power amplification.</a:t>
+            </a:r>
+          </a:p>
+        </p:txBody>
+      </p:sp>
+    </p:spTree>
+    <p:extLst>
+      <p:ext uri="{BB962C8B-B14F-4D97-AF65-F5344CB8AC3E}">
+        <p14:creationId xmlns:p14="http://schemas.microsoft.com/office/powerpoint/2010/main" val="2623177830"/>
+      </p:ext>
+    </p:extLst>
+  </p:cSld>
+  <p:clrMapOvr>
+    <a:masterClrMapping/>
+  </p:clrMapOvr>
+</p:sld>
+</file>
+
+<file path=ppt/slides/slide26.xml><?xml version="1.0" encoding="utf-8"?>
+<p:sld xmlns:a="http://schemas.openxmlformats.org/drawingml/2006/main" xmlns:r="http://schemas.openxmlformats.org/officeDocument/2006/relationships" xmlns:p="http://schemas.openxmlformats.org/presentationml/2006/main">
+  <p:cSld>
+    <p:spTree>
+      <p:nvGrpSpPr>
+        <p:cNvPr id="1" name="Shape 217"/>
+        <p:cNvGrpSpPr/>
+        <p:nvPr/>
+      </p:nvGrpSpPr>
+      <p:grpSpPr>
+        <a:xfrm>
+          <a:off x="0" y="0"/>
+          <a:ext cx="0" cy="0"/>
+          <a:chOff x="0" y="0"/>
+          <a:chExt cx="0" cy="0"/>
+        </a:xfrm>
+      </p:grpSpPr>
+      <p:sp>
+        <p:nvSpPr>
+          <p:cNvPr id="218" name="Google Shape;218;p32"/>
+          <p:cNvSpPr txBox="1">
+            <a:spLocks noGrp="1"/>
+          </p:cNvSpPr>
+          <p:nvPr>
+            <p:ph type="title"/>
+          </p:nvPr>
+        </p:nvSpPr>
+        <p:spPr>
+          <a:xfrm>
+            <a:off x="628650" y="316372"/>
+            <a:ext cx="7886700" cy="640800"/>
+          </a:xfrm>
+          <a:prstGeom prst="rect">
+            <a:avLst/>
+          </a:prstGeom>
+        </p:spPr>
+        <p:txBody>
+          <a:bodyPr spcFirstLastPara="1" wrap="square" lIns="91425" tIns="91425" rIns="91425" bIns="91425" anchor="ctr" anchorCtr="0">
+            <a:noAutofit/>
+          </a:bodyPr>
+          <a:lstStyle/>
+          <a:p>
+            <a:pPr marL="0" lvl="0" indent="0" algn="l" rtl="0">
+              <a:spcBef>
+                <a:spcPts val="0"/>
+              </a:spcBef>
+              <a:spcAft>
+                <a:spcPts val="0"/>
+              </a:spcAft>
+              <a:buNone/>
+            </a:pPr>
+            <a:r>
+              <a:rPr lang="en-US"/>
+              <a:t>Next Steps</a:t>
+            </a:r>
+            <a:endParaRPr/>
+          </a:p>
+        </p:txBody>
+      </p:sp>
+      <p:sp>
+        <p:nvSpPr>
+          <p:cNvPr id="219" name="Google Shape;219;p32"/>
+          <p:cNvSpPr txBox="1">
+            <a:spLocks noGrp="1"/>
+          </p:cNvSpPr>
+          <p:nvPr>
+            <p:ph type="body" idx="1"/>
+          </p:nvPr>
+        </p:nvSpPr>
+        <p:spPr>
+          <a:xfrm>
+            <a:off x="628650" y="1230597"/>
+            <a:ext cx="7886700" cy="5049000"/>
+          </a:xfrm>
+          <a:prstGeom prst="rect">
+            <a:avLst/>
+          </a:prstGeom>
+        </p:spPr>
+        <p:txBody>
+          <a:bodyPr spcFirstLastPara="1" wrap="square" lIns="91425" tIns="91425" rIns="91425" bIns="91425" anchor="t" anchorCtr="0">
+            <a:noAutofit/>
+          </a:bodyPr>
+          <a:lstStyle/>
+          <a:p>
+            <a:pPr marL="457200" lvl="0" indent="-361950" algn="l" rtl="0">
+              <a:spcBef>
+                <a:spcPts val="750"/>
+              </a:spcBef>
+              <a:spcAft>
+                <a:spcPts val="0"/>
+              </a:spcAft>
+              <a:buSzPts val="2100"/>
+              <a:buChar char="•"/>
+            </a:pPr>
+            <a:r>
+              <a:rPr lang="en-US" dirty="0"/>
+              <a:t>Include power amplification needed for carrier sensing in the total power calculation.</a:t>
+            </a:r>
+          </a:p>
+          <a:p>
+            <a:r>
+              <a:rPr lang="en-US" dirty="0"/>
+              <a:t>Theoretical bounds for the peak power amplification for the carrier sensing protocol.</a:t>
+            </a:r>
+          </a:p>
+          <a:p>
+            <a:r>
+              <a:rPr lang="en-US" dirty="0"/>
+              <a:t>Simulate a real world setting where each interfering camera can follow a different protocol.</a:t>
+            </a:r>
+          </a:p>
+        </p:txBody>
+      </p:sp>
+    </p:spTree>
+  </p:cSld>
+  <p:clrMapOvr>
+    <a:masterClrMapping/>
+  </p:clrMapOvr>
+</p:sld>
+</file>
+
+<file path=ppt/slides/slide27.xml><?xml version="1.0" encoding="utf-8"?>
+<p:sld xmlns:a="http://schemas.openxmlformats.org/drawingml/2006/main" xmlns:r="http://schemas.openxmlformats.org/officeDocument/2006/relationships" xmlns:p="http://schemas.openxmlformats.org/presentationml/2006/main">
+  <p:cSld>
+    <p:spTree>
+      <p:nvGrpSpPr>
+        <p:cNvPr id="1" name=""/>
+        <p:cNvGrpSpPr/>
+        <p:nvPr/>
+      </p:nvGrpSpPr>
+      <p:grpSpPr>
+        <a:xfrm>
+          <a:off x="0" y="0"/>
+          <a:ext cx="0" cy="0"/>
+          <a:chOff x="0" y="0"/>
+          <a:chExt cx="0" cy="0"/>
+        </a:xfrm>
+      </p:grpSpPr>
+      <p:sp>
+        <p:nvSpPr>
+          <p:cNvPr id="2" name="Title 1">
+            <a:extLst>
+              <a:ext uri="{FF2B5EF4-FFF2-40B4-BE49-F238E27FC236}">
+                <a16:creationId xmlns:a16="http://schemas.microsoft.com/office/drawing/2014/main" id="{D3F4E7ED-D746-B349-B22A-40F87BC13DA8}"/>
+              </a:ext>
+            </a:extLst>
+          </p:cNvPr>
+          <p:cNvSpPr>
+            <a:spLocks noGrp="1"/>
+          </p:cNvSpPr>
+          <p:nvPr>
+            <p:ph type="title"/>
+          </p:nvPr>
+        </p:nvSpPr>
+        <p:spPr>
+          <a:xfrm>
+            <a:off x="628650" y="3108532"/>
+            <a:ext cx="7886700" cy="640936"/>
+          </a:xfrm>
+        </p:spPr>
+        <p:txBody>
+          <a:bodyPr/>
+          <a:lstStyle/>
+          <a:p>
+            <a:pPr algn="ctr"/>
+            <a:r>
+              <a:rPr lang="en-US" dirty="0"/>
+              <a:t>Thank you !</a:t>
+            </a:r>
+          </a:p>
+        </p:txBody>
+      </p:sp>
+      <p:sp>
+        <p:nvSpPr>
+          <p:cNvPr id="4" name="Title 1">
+            <a:extLst>
+              <a:ext uri="{FF2B5EF4-FFF2-40B4-BE49-F238E27FC236}">
+                <a16:creationId xmlns:a16="http://schemas.microsoft.com/office/drawing/2014/main" id="{156A31B5-63A3-194D-B9A6-1021005ECE41}"/>
+              </a:ext>
+            </a:extLst>
+          </p:cNvPr>
+          <p:cNvSpPr txBox="1">
+            <a:spLocks/>
+          </p:cNvSpPr>
+          <p:nvPr/>
+        </p:nvSpPr>
+        <p:spPr>
+          <a:xfrm>
+            <a:off x="628650" y="3817885"/>
+            <a:ext cx="7886700" cy="640936"/>
+          </a:xfrm>
+          <a:prstGeom prst="rect">
+            <a:avLst/>
+          </a:prstGeom>
+          <a:noFill/>
+          <a:ln>
+            <a:noFill/>
+          </a:ln>
+        </p:spPr>
+        <p:txBody>
+          <a:bodyPr spcFirstLastPara="1" wrap="square" lIns="91425" tIns="91425" rIns="91425" bIns="91425" anchor="ctr" anchorCtr="0">
+            <a:noAutofit/>
+          </a:bodyPr>
+          <a:lstStyle>
+            <a:defPPr marR="0" lvl="0" algn="l" rtl="0">
+              <a:lnSpc>
+                <a:spcPct val="100000"/>
+              </a:lnSpc>
+              <a:spcBef>
+                <a:spcPts val="0"/>
+              </a:spcBef>
+              <a:spcAft>
+                <a:spcPts val="0"/>
+              </a:spcAft>
+            </a:defPPr>
+            <a:lvl1pPr marR="0" lvl="0" algn="l" rtl="0">
+              <a:lnSpc>
+                <a:spcPct val="90000"/>
+              </a:lnSpc>
+              <a:spcBef>
+                <a:spcPts val="0"/>
+              </a:spcBef>
+              <a:spcAft>
+                <a:spcPts val="0"/>
+              </a:spcAft>
+              <a:buClr>
+                <a:schemeClr val="dk1"/>
+              </a:buClr>
+              <a:buSzPts val="3300"/>
+              <a:buFont typeface="Arial"/>
+              <a:buNone/>
+              <a:defRPr sz="3300" b="0" i="0" u="none" strike="noStrike" cap="none">
+                <a:solidFill>
+                  <a:schemeClr val="dk1"/>
+                </a:solidFill>
+                <a:latin typeface="Arial"/>
+                <a:ea typeface="Arial"/>
+                <a:cs typeface="Arial"/>
+                <a:sym typeface="Arial"/>
+              </a:defRPr>
+            </a:lvl1pPr>
+            <a:lvl2pPr marR="0" lvl="1" algn="l" rtl="0">
+              <a:lnSpc>
+                <a:spcPct val="100000"/>
+              </a:lnSpc>
+              <a:spcBef>
+                <a:spcPts val="0"/>
+              </a:spcBef>
+              <a:spcAft>
+                <a:spcPts val="0"/>
+              </a:spcAft>
+              <a:buClr>
+                <a:srgbClr val="000000"/>
+              </a:buClr>
+              <a:buSzPts val="1400"/>
+              <a:buFont typeface="Arial"/>
+              <a:buNone/>
+              <a:defRPr sz="1800" b="0" i="0" u="none" strike="noStrike" cap="none">
+                <a:solidFill>
+                  <a:srgbClr val="000000"/>
+                </a:solidFill>
+                <a:latin typeface="Arial"/>
+                <a:ea typeface="Arial"/>
+                <a:cs typeface="Arial"/>
+                <a:sym typeface="Arial"/>
+              </a:defRPr>
+            </a:lvl2pPr>
+            <a:lvl3pPr marR="0" lvl="2" algn="l" rtl="0">
+              <a:lnSpc>
+                <a:spcPct val="100000"/>
+              </a:lnSpc>
+              <a:spcBef>
+                <a:spcPts val="0"/>
+              </a:spcBef>
+              <a:spcAft>
+                <a:spcPts val="0"/>
+              </a:spcAft>
+              <a:buClr>
+                <a:srgbClr val="000000"/>
+              </a:buClr>
+              <a:buSzPts val="1400"/>
+              <a:buFont typeface="Arial"/>
+              <a:buNone/>
+              <a:defRPr sz="1800" b="0" i="0" u="none" strike="noStrike" cap="none">
+                <a:solidFill>
+                  <a:srgbClr val="000000"/>
+                </a:solidFill>
+                <a:latin typeface="Arial"/>
+                <a:ea typeface="Arial"/>
+                <a:cs typeface="Arial"/>
+                <a:sym typeface="Arial"/>
+              </a:defRPr>
+            </a:lvl3pPr>
+            <a:lvl4pPr marR="0" lvl="3" algn="l" rtl="0">
+              <a:lnSpc>
+                <a:spcPct val="100000"/>
+              </a:lnSpc>
+              <a:spcBef>
+                <a:spcPts val="0"/>
+              </a:spcBef>
+              <a:spcAft>
+                <a:spcPts val="0"/>
+              </a:spcAft>
+              <a:buClr>
+                <a:srgbClr val="000000"/>
+              </a:buClr>
+              <a:buSzPts val="1400"/>
+              <a:buFont typeface="Arial"/>
+              <a:buNone/>
+              <a:defRPr sz="1800" b="0" i="0" u="none" strike="noStrike" cap="none">
+                <a:solidFill>
+                  <a:srgbClr val="000000"/>
+                </a:solidFill>
+                <a:latin typeface="Arial"/>
+                <a:ea typeface="Arial"/>
+                <a:cs typeface="Arial"/>
+                <a:sym typeface="Arial"/>
+              </a:defRPr>
+            </a:lvl4pPr>
+            <a:lvl5pPr marR="0" lvl="4" algn="l" rtl="0">
+              <a:lnSpc>
+                <a:spcPct val="100000"/>
+              </a:lnSpc>
+              <a:spcBef>
+                <a:spcPts val="0"/>
+              </a:spcBef>
+              <a:spcAft>
+                <a:spcPts val="0"/>
+              </a:spcAft>
+              <a:buClr>
+                <a:srgbClr val="000000"/>
+              </a:buClr>
+              <a:buSzPts val="1400"/>
+              <a:buFont typeface="Arial"/>
+              <a:buNone/>
+              <a:defRPr sz="1800" b="0" i="0" u="none" strike="noStrike" cap="none">
+                <a:solidFill>
+                  <a:srgbClr val="000000"/>
+                </a:solidFill>
+                <a:latin typeface="Arial"/>
+                <a:ea typeface="Arial"/>
+                <a:cs typeface="Arial"/>
+                <a:sym typeface="Arial"/>
+              </a:defRPr>
+            </a:lvl5pPr>
+            <a:lvl6pPr marR="0" lvl="5" algn="l" rtl="0">
+              <a:lnSpc>
+                <a:spcPct val="100000"/>
+              </a:lnSpc>
+              <a:spcBef>
+                <a:spcPts val="0"/>
+              </a:spcBef>
+              <a:spcAft>
+                <a:spcPts val="0"/>
+              </a:spcAft>
+              <a:buClr>
+                <a:srgbClr val="000000"/>
+              </a:buClr>
+              <a:buSzPts val="1400"/>
+              <a:buFont typeface="Arial"/>
+              <a:buNone/>
+              <a:defRPr sz="1800" b="0" i="0" u="none" strike="noStrike" cap="none">
+                <a:solidFill>
+                  <a:srgbClr val="000000"/>
+                </a:solidFill>
+                <a:latin typeface="Arial"/>
+                <a:ea typeface="Arial"/>
+                <a:cs typeface="Arial"/>
+                <a:sym typeface="Arial"/>
+              </a:defRPr>
+            </a:lvl6pPr>
+            <a:lvl7pPr marR="0" lvl="6" algn="l" rtl="0">
+              <a:lnSpc>
+                <a:spcPct val="100000"/>
+              </a:lnSpc>
+              <a:spcBef>
+                <a:spcPts val="0"/>
+              </a:spcBef>
+              <a:spcAft>
+                <a:spcPts val="0"/>
+              </a:spcAft>
+              <a:buClr>
+                <a:srgbClr val="000000"/>
+              </a:buClr>
+              <a:buSzPts val="1400"/>
+              <a:buFont typeface="Arial"/>
+              <a:buNone/>
+              <a:defRPr sz="1800" b="0" i="0" u="none" strike="noStrike" cap="none">
+                <a:solidFill>
+                  <a:srgbClr val="000000"/>
+                </a:solidFill>
+                <a:latin typeface="Arial"/>
+                <a:ea typeface="Arial"/>
+                <a:cs typeface="Arial"/>
+                <a:sym typeface="Arial"/>
+              </a:defRPr>
+            </a:lvl7pPr>
+            <a:lvl8pPr marR="0" lvl="7" algn="l" rtl="0">
+              <a:lnSpc>
+                <a:spcPct val="100000"/>
+              </a:lnSpc>
+              <a:spcBef>
+                <a:spcPts val="0"/>
+              </a:spcBef>
+              <a:spcAft>
+                <a:spcPts val="0"/>
+              </a:spcAft>
+              <a:buClr>
+                <a:srgbClr val="000000"/>
+              </a:buClr>
+              <a:buSzPts val="1400"/>
+              <a:buFont typeface="Arial"/>
+              <a:buNone/>
+              <a:defRPr sz="1800" b="0" i="0" u="none" strike="noStrike" cap="none">
+                <a:solidFill>
+                  <a:srgbClr val="000000"/>
+                </a:solidFill>
+                <a:latin typeface="Arial"/>
+                <a:ea typeface="Arial"/>
+                <a:cs typeface="Arial"/>
+                <a:sym typeface="Arial"/>
+              </a:defRPr>
+            </a:lvl8pPr>
+            <a:lvl9pPr marR="0" lvl="8" algn="l" rtl="0">
+              <a:lnSpc>
+                <a:spcPct val="100000"/>
+              </a:lnSpc>
+              <a:spcBef>
+                <a:spcPts val="0"/>
+              </a:spcBef>
+              <a:spcAft>
+                <a:spcPts val="0"/>
+              </a:spcAft>
+              <a:buClr>
+                <a:srgbClr val="000000"/>
+              </a:buClr>
+              <a:buSzPts val="1400"/>
+              <a:buFont typeface="Arial"/>
+              <a:buNone/>
+              <a:defRPr sz="1800" b="0" i="0" u="none" strike="noStrike" cap="none">
+                <a:solidFill>
+                  <a:srgbClr val="000000"/>
+                </a:solidFill>
+                <a:latin typeface="Arial"/>
+                <a:ea typeface="Arial"/>
+                <a:cs typeface="Arial"/>
+                <a:sym typeface="Arial"/>
+              </a:defRPr>
+            </a:lvl9pPr>
+          </a:lstStyle>
+          <a:p>
+            <a:pPr algn="ctr"/>
+            <a:r>
+              <a:rPr lang="en-US" dirty="0"/>
+              <a:t>Questions ? </a:t>
+            </a:r>
+          </a:p>
+        </p:txBody>
+      </p:sp>
+    </p:spTree>
+    <p:extLst>
+      <p:ext uri="{BB962C8B-B14F-4D97-AF65-F5344CB8AC3E}">
+        <p14:creationId xmlns:p14="http://schemas.microsoft.com/office/powerpoint/2010/main" val="4169911005"/>
+      </p:ext>
+    </p:extLst>
   </p:cSld>
   <p:clrMapOvr>
     <a:masterClrMapping/>

</xml_diff>